<commit_message>
Update of Power Point Presentation
</commit_message>
<xml_diff>
--- a/Presentation in progress/SQL TEAM 6 FOOD INSECURITY PRESENTATION.pptx
+++ b/Presentation in progress/SQL TEAM 6 FOOD INSECURITY PRESENTATION.pptx
@@ -8,14 +8,13 @@
     <p:sldId id="256" r:id="rId2"/>
     <p:sldId id="257" r:id="rId3"/>
     <p:sldId id="258" r:id="rId4"/>
-    <p:sldId id="259" r:id="rId5"/>
-    <p:sldId id="260" r:id="rId6"/>
+    <p:sldId id="260" r:id="rId5"/>
+    <p:sldId id="259" r:id="rId6"/>
     <p:sldId id="261" r:id="rId7"/>
     <p:sldId id="262" r:id="rId8"/>
-    <p:sldId id="263" r:id="rId9"/>
-    <p:sldId id="264" r:id="rId10"/>
-    <p:sldId id="265" r:id="rId11"/>
-    <p:sldId id="266" r:id="rId12"/>
+    <p:sldId id="264" r:id="rId9"/>
+    <p:sldId id="265" r:id="rId10"/>
+    <p:sldId id="266" r:id="rId11"/>
   </p:sldIdLst>
   <p:sldSz cx="12192000" cy="6858000"/>
   <p:notesSz cx="6858000" cy="9144000"/>
@@ -114,6 +113,11 @@
       </a:defRPr>
     </a:lvl9pPr>
   </p:defaultTextStyle>
+  <p:extLst>
+    <p:ext uri="{EFAFB233-063F-42B5-8137-9DF3F51BA10A}">
+      <p15:sldGuideLst xmlns:p15="http://schemas.microsoft.com/office/powerpoint/2012/main"/>
+    </p:ext>
+  </p:extLst>
 </p:presentation>
 </file>
 
@@ -260,7 +264,7 @@
           <a:p>
             <a:fld id="{2395C5C9-164C-46B3-A87E-7660D39D3106}" type="datetime2">
               <a:rPr lang="en-US" smtClean="0"/>
-              <a:t>Tuesday, March 14, 2023</a:t>
+              <a:t>Thursday, March 16, 2023</a:t>
             </a:fld>
             <a:endParaRPr lang="en-US" dirty="0"/>
           </a:p>
@@ -463,7 +467,7 @@
           <a:p>
             <a:fld id="{5B75179A-1E2B-41AB-B400-4F1B4022FAEE}" type="datetime2">
               <a:rPr lang="en-US" smtClean="0"/>
-              <a:t>Tuesday, March 14, 2023</a:t>
+              <a:t>Thursday, March 16, 2023</a:t>
             </a:fld>
             <a:endParaRPr lang="en-US"/>
           </a:p>
@@ -676,7 +680,7 @@
           <a:p>
             <a:fld id="{05681D0F-6595-4F14-8EF3-954CD87C797B}" type="datetime2">
               <a:rPr lang="en-US" smtClean="0"/>
-              <a:t>Tuesday, March 14, 2023</a:t>
+              <a:t>Thursday, March 16, 2023</a:t>
             </a:fld>
             <a:endParaRPr lang="en-US"/>
           </a:p>
@@ -878,7 +882,7 @@
           <a:p>
             <a:fld id="{4DDCFF8A-AAF8-4A12-8A91-9CA0EAF6CBB9}" type="datetime2">
               <a:rPr lang="en-US" smtClean="0"/>
-              <a:t>Tuesday, March 14, 2023</a:t>
+              <a:t>Thursday, March 16, 2023</a:t>
             </a:fld>
             <a:endParaRPr lang="en-US" dirty="0"/>
           </a:p>
@@ -1157,7 +1161,7 @@
           <a:p>
             <a:fld id="{ABCC25C3-021A-4B0B-8F70-0C181FE1CF45}" type="datetime2">
               <a:rPr lang="en-US" smtClean="0"/>
-              <a:t>Tuesday, March 14, 2023</a:t>
+              <a:t>Thursday, March 16, 2023</a:t>
             </a:fld>
             <a:endParaRPr lang="en-US"/>
           </a:p>
@@ -1417,7 +1421,7 @@
           <a:p>
             <a:fld id="{0C23D88D-8CEC-4ED9-A53B-5596187D9A16}" type="datetime2">
               <a:rPr lang="en-US" smtClean="0"/>
-              <a:t>Tuesday, March 14, 2023</a:t>
+              <a:t>Thursday, March 16, 2023</a:t>
             </a:fld>
             <a:endParaRPr lang="en-US"/>
           </a:p>
@@ -1833,7 +1837,7 @@
           <a:p>
             <a:fld id="{D2CCD382-DFDA-4722-A27A-59C21AD112F2}" type="datetime2">
               <a:rPr lang="en-US" smtClean="0"/>
-              <a:t>Tuesday, March 14, 2023</a:t>
+              <a:t>Thursday, March 16, 2023</a:t>
             </a:fld>
             <a:endParaRPr lang="en-US"/>
           </a:p>
@@ -1978,7 +1982,7 @@
           <a:p>
             <a:fld id="{22F2A30D-1C09-413F-AAB1-38F366000715}" type="datetime2">
               <a:rPr lang="en-US" smtClean="0"/>
-              <a:t>Tuesday, March 14, 2023</a:t>
+              <a:t>Thursday, March 16, 2023</a:t>
             </a:fld>
             <a:endParaRPr lang="en-US"/>
           </a:p>
@@ -2100,7 +2104,7 @@
           <a:p>
             <a:fld id="{6DB82B9C-D65E-4F64-95C3-B10F3B00F0D9}" type="datetime2">
               <a:rPr lang="en-US" smtClean="0"/>
-              <a:t>Tuesday, March 14, 2023</a:t>
+              <a:t>Thursday, March 16, 2023</a:t>
             </a:fld>
             <a:endParaRPr lang="en-US"/>
           </a:p>
@@ -2423,7 +2427,7 @@
           <a:p>
             <a:fld id="{B7F5FDCC-6AAC-4A08-B9E0-3793AB5E64C3}" type="datetime2">
               <a:rPr lang="en-US" smtClean="0"/>
-              <a:t>Tuesday, March 14, 2023</a:t>
+              <a:t>Thursday, March 16, 2023</a:t>
             </a:fld>
             <a:endParaRPr lang="en-US"/>
           </a:p>
@@ -2711,7 +2715,7 @@
           <a:p>
             <a:fld id="{349FE94D-439C-40F1-900E-BC07940E3988}" type="datetime2">
               <a:rPr lang="en-US" smtClean="0"/>
-              <a:t>Tuesday, March 14, 2023</a:t>
+              <a:t>Thursday, March 16, 2023</a:t>
             </a:fld>
             <a:endParaRPr lang="en-US"/>
           </a:p>
@@ -2999,7 +3003,7 @@
           <a:p>
             <a:fld id="{8DEA2CF1-0EB2-4673-802D-3371233E4A77}" type="datetime2">
               <a:rPr lang="en-US" smtClean="0"/>
-              <a:t>Tuesday, March 14, 2023</a:t>
+              <a:t>Thursday, March 16, 2023</a:t>
             </a:fld>
             <a:endParaRPr lang="en-US" dirty="0"/>
           </a:p>
@@ -3600,7 +3604,7 @@
           <a:p>
             <a:r>
               <a:rPr lang="en-US" sz="1800" dirty="0"/>
-              <a:t>EMORY SCOTT</a:t>
+              <a:t>EMERY SCOTT</a:t>
             </a:r>
           </a:p>
           <a:p>
@@ -4242,14 +4246,6 @@
 <file path=ppt/slides/slide10.xml><?xml version="1.0" encoding="utf-8"?>
 <p:sld xmlns:a="http://schemas.openxmlformats.org/drawingml/2006/main" xmlns:r="http://schemas.openxmlformats.org/officeDocument/2006/relationships" xmlns:p="http://schemas.openxmlformats.org/presentationml/2006/main">
   <p:cSld>
-    <p:bg>
-      <p:bgPr>
-        <a:solidFill>
-          <a:schemeClr val="bg2"/>
-        </a:solidFill>
-        <a:effectLst/>
-      </p:bgPr>
-    </p:bg>
     <p:spTree>
       <p:nvGrpSpPr>
         <p:cNvPr id="1" name=""/>
@@ -4266,305 +4262,106 @@
       </p:grpSpPr>
       <p:sp>
         <p:nvSpPr>
-          <p:cNvPr id="9" name="Rectangle 8">
+          <p:cNvPr id="2" name="Title 1">
             <a:extLst>
               <a:ext uri="{FF2B5EF4-FFF2-40B4-BE49-F238E27FC236}">
-                <a16:creationId xmlns:a16="http://schemas.microsoft.com/office/drawing/2014/main" id="{09646535-AEF6-4883-A4F9-EEC1F8B4319E}"/>
-              </a:ext>
-              <a:ext uri="{C183D7F6-B498-43B3-948B-1728B52AA6E4}">
-                <adec:decorative xmlns:adec="http://schemas.microsoft.com/office/drawing/2017/decorative" val="1"/>
+                <a16:creationId xmlns:a16="http://schemas.microsoft.com/office/drawing/2014/main" id="{D6DC0C66-5058-527E-0476-DFD8CBC8D526}"/>
               </a:ext>
             </a:extLst>
           </p:cNvPr>
           <p:cNvSpPr>
-            <a:spLocks noGrp="1" noRot="1" noChangeAspect="1" noMove="1" noResize="1" noEditPoints="1" noAdjustHandles="1" noChangeArrowheads="1" noChangeShapeType="1" noTextEdit="1"/>
-          </p:cNvSpPr>
-          <p:nvPr>
-            <p:extLst>
-              <p:ext uri="{386F3935-93C4-4BCD-93E2-E3B085C9AB24}">
-                <p16:designElem xmlns:p16="http://schemas.microsoft.com/office/powerpoint/2015/main" val="1"/>
-              </p:ext>
-            </p:extLst>
-          </p:nvPr>
-        </p:nvSpPr>
-        <p:spPr>
-          <a:xfrm>
-            <a:off x="0" y="0"/>
-            <a:ext cx="12192000" cy="6858000"/>
-          </a:xfrm>
-          <a:prstGeom prst="rect">
-            <a:avLst/>
-          </a:prstGeom>
-          <a:solidFill>
-            <a:schemeClr val="bg2">
-              <a:lumMod val="90000"/>
-              <a:lumOff val="10000"/>
-            </a:schemeClr>
-          </a:solidFill>
-          <a:ln w="12700" cap="flat" cmpd="sng" algn="ctr">
-            <a:noFill/>
-            <a:prstDash val="solid"/>
-            <a:miter lim="800000"/>
-          </a:ln>
-          <a:effectLst/>
-        </p:spPr>
-        <p:style>
-          <a:lnRef idx="2">
-            <a:schemeClr val="accent1">
-              <a:shade val="50000"/>
-            </a:schemeClr>
-          </a:lnRef>
-          <a:fillRef idx="1">
-            <a:schemeClr val="accent1"/>
-          </a:fillRef>
-          <a:effectRef idx="0">
-            <a:schemeClr val="accent1"/>
-          </a:effectRef>
-          <a:fontRef idx="minor">
-            <a:schemeClr val="lt1"/>
-          </a:fontRef>
-        </p:style>
-        <p:txBody>
-          <a:bodyPr rtlCol="0" anchor="ctr"/>
-          <a:lstStyle/>
-          <a:p>
-            <a:pPr algn="ctr"/>
-            <a:endParaRPr lang="en-US"/>
-          </a:p>
-        </p:txBody>
-      </p:sp>
-      <p:sp useBgFill="1">
-        <p:nvSpPr>
-          <p:cNvPr id="11" name="Rectangle 10">
+            <a:spLocks noGrp="1"/>
+          </p:cNvSpPr>
+          <p:nvPr>
+            <p:ph type="title"/>
+          </p:nvPr>
+        </p:nvSpPr>
+        <p:spPr>
+          <a:xfrm>
+            <a:off x="720000" y="619200"/>
+            <a:ext cx="10728322" cy="704775"/>
+          </a:xfrm>
+        </p:spPr>
+        <p:txBody>
+          <a:bodyPr/>
+          <a:lstStyle/>
+          <a:p>
+            <a:r>
+              <a:rPr lang="en-US" dirty="0"/>
+              <a:t>REFERENCES</a:t>
+            </a:r>
+          </a:p>
+        </p:txBody>
+      </p:sp>
+      <p:sp>
+        <p:nvSpPr>
+          <p:cNvPr id="3" name="Content Placeholder 2">
             <a:extLst>
               <a:ext uri="{FF2B5EF4-FFF2-40B4-BE49-F238E27FC236}">
-                <a16:creationId xmlns:a16="http://schemas.microsoft.com/office/drawing/2014/main" id="{742DFF2D-EA41-4CBE-9659-C2917E4882E5}"/>
-              </a:ext>
-              <a:ext uri="{C183D7F6-B498-43B3-948B-1728B52AA6E4}">
-                <adec:decorative xmlns:adec="http://schemas.microsoft.com/office/drawing/2017/decorative" val="1"/>
+                <a16:creationId xmlns:a16="http://schemas.microsoft.com/office/drawing/2014/main" id="{CF1D7140-A46C-9DCA-2EA8-ABE5FCC0FBEF}"/>
               </a:ext>
             </a:extLst>
           </p:cNvPr>
           <p:cNvSpPr>
-            <a:spLocks noGrp="1" noRot="1" noChangeAspect="1" noMove="1" noResize="1" noEditPoints="1" noAdjustHandles="1" noChangeArrowheads="1" noChangeShapeType="1" noTextEdit="1"/>
-          </p:cNvSpPr>
-          <p:nvPr>
-            <p:extLst>
-              <p:ext uri="{386F3935-93C4-4BCD-93E2-E3B085C9AB24}">
-                <p16:designElem xmlns:p16="http://schemas.microsoft.com/office/powerpoint/2015/main" val="1"/>
-              </p:ext>
-            </p:extLst>
-          </p:nvPr>
-        </p:nvSpPr>
-        <p:spPr>
-          <a:xfrm>
-            <a:off x="0" y="0"/>
-            <a:ext cx="12192000" cy="6858000"/>
-          </a:xfrm>
-          <a:prstGeom prst="rect">
-            <a:avLst/>
-          </a:prstGeom>
-          <a:ln w="12700" cap="flat" cmpd="sng" algn="ctr">
-            <a:noFill/>
-            <a:prstDash val="solid"/>
-            <a:miter lim="800000"/>
-          </a:ln>
-          <a:effectLst/>
-        </p:spPr>
-        <p:style>
-          <a:lnRef idx="2">
-            <a:schemeClr val="accent1">
-              <a:shade val="50000"/>
-            </a:schemeClr>
-          </a:lnRef>
-          <a:fillRef idx="1">
-            <a:schemeClr val="accent1"/>
-          </a:fillRef>
-          <a:effectRef idx="0">
-            <a:schemeClr val="accent1"/>
-          </a:effectRef>
-          <a:fontRef idx="minor">
-            <a:schemeClr val="lt1"/>
-          </a:fontRef>
-        </p:style>
-        <p:txBody>
-          <a:bodyPr rtlCol="0" anchor="ctr"/>
-          <a:lstStyle/>
-          <a:p>
-            <a:pPr algn="ctr"/>
-            <a:endParaRPr lang="en-US"/>
-          </a:p>
-        </p:txBody>
-      </p:sp>
-      <p:sp>
-        <p:nvSpPr>
-          <p:cNvPr id="2" name="Title 1">
-            <a:extLst>
-              <a:ext uri="{FF2B5EF4-FFF2-40B4-BE49-F238E27FC236}">
-                <a16:creationId xmlns:a16="http://schemas.microsoft.com/office/drawing/2014/main" id="{6B4723EE-5137-C0E2-C5AA-0B6314509BAA}"/>
-              </a:ext>
-            </a:extLst>
-          </p:cNvPr>
-          <p:cNvSpPr>
             <a:spLocks noGrp="1"/>
           </p:cNvSpPr>
           <p:nvPr>
-            <p:ph type="title"/>
-          </p:nvPr>
-        </p:nvSpPr>
-        <p:spPr>
-          <a:xfrm>
-            <a:off x="247650" y="419100"/>
-            <a:ext cx="6629400" cy="1971675"/>
-          </a:xfrm>
-        </p:spPr>
-        <p:txBody>
-          <a:bodyPr vert="horz" wrap="square" lIns="0" tIns="0" rIns="0" bIns="0" rtlCol="0" anchor="b" anchorCtr="0">
-            <a:normAutofit/>
+            <p:ph idx="1"/>
+          </p:nvPr>
+        </p:nvSpPr>
+        <p:spPr>
+          <a:xfrm>
+            <a:off x="719997" y="1205866"/>
+            <a:ext cx="10728325" cy="4772024"/>
+          </a:xfrm>
+        </p:spPr>
+        <p:txBody>
+          <a:bodyPr>
+            <a:normAutofit fontScale="92500" lnSpcReduction="20000"/>
           </a:bodyPr>
           <a:lstStyle/>
           <a:p>
-            <a:pPr algn="ctr">
-              <a:lnSpc>
-                <a:spcPct val="90000"/>
-              </a:lnSpc>
-            </a:pPr>
-            <a:r>
-              <a:rPr lang="en-US" sz="3100" b="0" i="0" spc="-100" dirty="0">
+            <a:r>
+              <a:rPr lang="en-US" dirty="0">
+                <a:solidFill>
+                  <a:schemeClr val="tx1"/>
+                </a:solidFill>
+              </a:rPr>
+              <a:t>USDA, 2023</a:t>
+            </a:r>
+          </a:p>
+          <a:p>
+            <a:r>
+              <a:rPr lang="en-US" b="0" i="0" u="none" strike="noStrike" dirty="0">
+                <a:solidFill>
+                  <a:schemeClr val="tx1"/>
+                </a:solidFill>
                 <a:effectLst/>
+                <a:latin typeface="-apple-system"/>
+                <a:hlinkClick r:id="rId2">
+                  <a:extLst>
+                    <a:ext uri="{A12FA001-AC4F-418D-AE19-62706E023703}">
+                      <ahyp:hlinkClr xmlns:ahyp="http://schemas.microsoft.com/office/drawing/2018/hyperlinkcolor" val="tx"/>
+                    </a:ext>
+                  </a:extLst>
+                </a:hlinkClick>
               </a:rPr>
-              <a:t>THE TECHNOLOGIES, LANGUAGES, TOOLS AND ALGORITHMS THAT THE TEAM USED THROUGHOUT THE PROJECT</a:t>
-            </a:r>
-            <a:endParaRPr lang="en-US" sz="3100" spc="-100" dirty="0"/>
-          </a:p>
-        </p:txBody>
-      </p:sp>
-      <p:pic>
-        <p:nvPicPr>
-          <p:cNvPr id="5" name="Picture 4" descr="Computer script on a screen">
-            <a:extLst>
-              <a:ext uri="{FF2B5EF4-FFF2-40B4-BE49-F238E27FC236}">
-                <a16:creationId xmlns:a16="http://schemas.microsoft.com/office/drawing/2014/main" id="{B010DBD8-036C-7705-F7CA-A06E63E1A8BE}"/>
-              </a:ext>
-            </a:extLst>
-          </p:cNvPr>
-          <p:cNvPicPr>
-            <a:picLocks noChangeAspect="1"/>
-          </p:cNvPicPr>
-          <p:nvPr/>
-        </p:nvPicPr>
-        <p:blipFill rotWithShape="1">
-          <a:blip r:embed="rId2"/>
-          <a:srcRect l="2554" r="42327" b="-1"/>
-          <a:stretch/>
-        </p:blipFill>
-        <p:spPr>
-          <a:xfrm>
-            <a:off x="6529067" y="10"/>
-            <a:ext cx="5662935" cy="6857990"/>
-          </a:xfrm>
-          <a:custGeom>
-            <a:avLst/>
-            <a:gdLst/>
-            <a:ahLst/>
-            <a:cxnLst/>
-            <a:rect l="l" t="t" r="r" b="b"/>
-            <a:pathLst>
-              <a:path w="5662935" h="6858000">
-                <a:moveTo>
-                  <a:pt x="598332" y="0"/>
-                </a:moveTo>
-                <a:lnTo>
-                  <a:pt x="5662935" y="0"/>
-                </a:lnTo>
-                <a:lnTo>
-                  <a:pt x="5662935" y="6858000"/>
-                </a:lnTo>
-                <a:lnTo>
-                  <a:pt x="0" y="6858000"/>
-                </a:lnTo>
-                <a:lnTo>
-                  <a:pt x="78957" y="6777438"/>
-                </a:lnTo>
-                <a:cubicBezTo>
-                  <a:pt x="291624" y="6544265"/>
-                  <a:pt x="490445" y="6275955"/>
-                  <a:pt x="672224" y="5969316"/>
-                </a:cubicBezTo>
-                <a:cubicBezTo>
-                  <a:pt x="914597" y="5515036"/>
-                  <a:pt x="1066080" y="5030470"/>
-                  <a:pt x="1217563" y="4515619"/>
-                </a:cubicBezTo>
-                <a:cubicBezTo>
-                  <a:pt x="1338748" y="3970483"/>
-                  <a:pt x="1399341" y="3516203"/>
-                  <a:pt x="1399341" y="3061922"/>
-                </a:cubicBezTo>
-                <a:cubicBezTo>
-                  <a:pt x="1399341" y="1948936"/>
-                  <a:pt x="1190580" y="1021447"/>
-                  <a:pt x="773055" y="279455"/>
-                </a:cubicBezTo>
-                <a:close/>
-              </a:path>
-            </a:pathLst>
-          </a:custGeom>
-        </p:spPr>
-      </p:pic>
-      <p:sp>
-        <p:nvSpPr>
-          <p:cNvPr id="6" name="TextBox 5">
-            <a:extLst>
-              <a:ext uri="{FF2B5EF4-FFF2-40B4-BE49-F238E27FC236}">
-                <a16:creationId xmlns:a16="http://schemas.microsoft.com/office/drawing/2014/main" id="{F31193C0-7D49-9C52-BE31-DEC81CDB49A7}"/>
-              </a:ext>
-            </a:extLst>
-          </p:cNvPr>
-          <p:cNvSpPr txBox="1"/>
-          <p:nvPr/>
-        </p:nvSpPr>
-        <p:spPr>
-          <a:xfrm>
-            <a:off x="371475" y="2828835"/>
-            <a:ext cx="6505575" cy="1200329"/>
-          </a:xfrm>
-          <a:prstGeom prst="rect">
-            <a:avLst/>
-          </a:prstGeom>
-          <a:noFill/>
-        </p:spPr>
-        <p:txBody>
-          <a:bodyPr wrap="square">
-            <a:spAutoFit/>
-          </a:bodyPr>
-          <a:lstStyle/>
-          <a:p>
-            <a:pPr marL="285750" indent="-285750">
-              <a:buFont typeface="Arial" panose="020B0604020202020204" pitchFamily="34" charset="0"/>
-              <a:buChar char="•"/>
-            </a:pPr>
-            <a:r>
-              <a:rPr lang="en-US" b="0" i="0" dirty="0">
-                <a:effectLst/>
-                <a:latin typeface="Roboto" panose="02000000000000000000" pitchFamily="2" charset="0"/>
-              </a:rPr>
-              <a:t>PYTHON- JUPYTER NOTEBOOK</a:t>
-            </a:r>
-          </a:p>
-          <a:p>
-            <a:pPr marL="285750" indent="-285750">
-              <a:buFont typeface="Arial" panose="020B0604020202020204" pitchFamily="34" charset="0"/>
-              <a:buChar char="•"/>
-            </a:pPr>
+              <a:t>https://www.ers.usda.gov/webdocs/publications/45020/30967_err141.pdf</a:t>
+            </a:r>
+            <a:endParaRPr lang="en-US" b="0" i="0" u="none" strike="noStrike" dirty="0">
+              <a:solidFill>
+                <a:schemeClr val="tx1"/>
+              </a:solidFill>
+              <a:effectLst/>
+              <a:latin typeface="-apple-system"/>
+            </a:endParaRPr>
+          </a:p>
+          <a:p>
             <a:r>
               <a:rPr lang="en-US" dirty="0">
-                <a:latin typeface="Roboto" panose="02000000000000000000" pitchFamily="2" charset="0"/>
-              </a:rPr>
-              <a:t>ERD Generator- </a:t>
-            </a:r>
-            <a:r>
-              <a:rPr lang="en-US" dirty="0" err="1">
+                <a:solidFill>
+                  <a:srgbClr val="715CC8"/>
+                </a:solidFill>
                 <a:hlinkClick r:id="rId3">
                   <a:extLst>
                     <a:ext uri="{A12FA001-AC4F-418D-AE19-62706E023703}">
@@ -4573,10 +4370,13 @@
                   </a:extLst>
                 </a:hlinkClick>
               </a:rPr>
-              <a:t>QuickDBD</a:t>
+              <a:t>USDA ERS - Data Access and Documentation </a:t>
             </a:r>
             <a:r>
               <a:rPr lang="en-US" dirty="0">
+                <a:solidFill>
+                  <a:schemeClr val="tx1"/>
+                </a:solidFill>
                 <a:hlinkClick r:id="rId3">
                   <a:extLst>
                     <a:ext uri="{A12FA001-AC4F-418D-AE19-62706E023703}">
@@ -4585,158 +4385,178 @@
                   </a:extLst>
                 </a:hlinkClick>
               </a:rPr>
-              <a:t> (quickdatabasediagrams.com)</a:t>
-            </a:r>
-            <a:endParaRPr lang="en-US" b="0" i="0" dirty="0">
+              <a:t>Downloads</a:t>
+            </a:r>
+            <a:endParaRPr lang="en-US" dirty="0">
+              <a:solidFill>
+                <a:schemeClr val="tx1"/>
+              </a:solidFill>
+            </a:endParaRPr>
+          </a:p>
+          <a:p>
+            <a:r>
+              <a:rPr lang="en-US" b="0" i="0" u="none" strike="noStrike" dirty="0">
+                <a:solidFill>
+                  <a:schemeClr val="tx1"/>
+                </a:solidFill>
+                <a:effectLst/>
+                <a:latin typeface="Slack-Lato"/>
+                <a:hlinkClick r:id="rId4">
+                  <a:extLst>
+                    <a:ext uri="{A12FA001-AC4F-418D-AE19-62706E023703}">
+                      <ahyp:hlinkClr xmlns:ahyp="http://schemas.microsoft.com/office/drawing/2018/hyperlinkcolor" val="tx"/>
+                    </a:ext>
+                  </a:extLst>
+                </a:hlinkClick>
+              </a:rPr>
+              <a:t>https://www.ers.usda.gov/webdocs/publications/44906/6893_err125_2_.pdf?v=5244</a:t>
+            </a:r>
+            <a:endParaRPr lang="en-US" b="0" i="0" u="none" strike="noStrike" dirty="0">
+              <a:solidFill>
+                <a:schemeClr val="tx1"/>
+              </a:solidFill>
               <a:effectLst/>
-              <a:latin typeface="Roboto" panose="02000000000000000000" pitchFamily="2" charset="0"/>
+              <a:latin typeface="Slack-Lato"/>
             </a:endParaRPr>
           </a:p>
           <a:p>
-            <a:pPr marL="285750" indent="-285750">
-              <a:buFont typeface="Arial" panose="020B0604020202020204" pitchFamily="34" charset="0"/>
-              <a:buChar char="•"/>
+            <a:pPr marL="0" indent="0">
+              <a:buNone/>
             </a:pPr>
-            <a:r>
+            <a:br>
               <a:rPr lang="en-US" dirty="0">
-                <a:latin typeface="Roboto" panose="02000000000000000000" pitchFamily="2" charset="0"/>
+                <a:solidFill>
+                  <a:schemeClr val="tx1"/>
+                </a:solidFill>
               </a:rPr>
-              <a:t>PostgreSQL (</a:t>
-            </a:r>
-            <a:r>
-              <a:rPr lang="en-US" dirty="0" err="1">
-                <a:latin typeface="Roboto" panose="02000000000000000000" pitchFamily="2" charset="0"/>
+            </a:br>
+            <a:r>
+              <a:rPr lang="en-US" dirty="0">
+                <a:solidFill>
+                  <a:schemeClr val="tx1"/>
+                </a:solidFill>
               </a:rPr>
-              <a:t>pgAdmin</a:t>
-            </a:r>
-            <a:r>
-              <a:rPr lang="en-US" dirty="0">
-                <a:latin typeface="Roboto" panose="02000000000000000000" pitchFamily="2" charset="0"/>
+              <a:t>   </a:t>
+            </a:r>
+            <a:r>
+              <a:rPr lang="en-US" b="0" i="0" dirty="0">
+                <a:solidFill>
+                  <a:schemeClr val="tx1"/>
+                </a:solidFill>
+                <a:effectLst/>
+                <a:latin typeface="Slack-Lato"/>
               </a:rPr>
-              <a:t>)</a:t>
-            </a:r>
-          </a:p>
-          <a:p>
-            <a:endParaRPr lang="en-US" dirty="0"/>
-          </a:p>
-        </p:txBody>
-      </p:sp>
-    </p:spTree>
-    <p:extLst>
-      <p:ext uri="{BB962C8B-B14F-4D97-AF65-F5344CB8AC3E}">
-        <p14:creationId xmlns:p14="http://schemas.microsoft.com/office/powerpoint/2010/main" val="3945959391"/>
-      </p:ext>
-    </p:extLst>
-  </p:cSld>
-  <p:clrMapOvr>
-    <a:masterClrMapping/>
-  </p:clrMapOvr>
-</p:sld>
-</file>
-
-<file path=ppt/slides/slide11.xml><?xml version="1.0" encoding="utf-8"?>
-<p:sld xmlns:a="http://schemas.openxmlformats.org/drawingml/2006/main" xmlns:r="http://schemas.openxmlformats.org/officeDocument/2006/relationships" xmlns:p="http://schemas.openxmlformats.org/presentationml/2006/main">
-  <p:cSld>
-    <p:spTree>
-      <p:nvGrpSpPr>
-        <p:cNvPr id="1" name=""/>
-        <p:cNvGrpSpPr/>
-        <p:nvPr/>
-      </p:nvGrpSpPr>
-      <p:grpSpPr>
-        <a:xfrm>
-          <a:off x="0" y="0"/>
-          <a:ext cx="0" cy="0"/>
-          <a:chOff x="0" y="0"/>
-          <a:chExt cx="0" cy="0"/>
-        </a:xfrm>
-      </p:grpSpPr>
-      <p:sp>
-        <p:nvSpPr>
-          <p:cNvPr id="2" name="Title 1">
-            <a:extLst>
-              <a:ext uri="{FF2B5EF4-FFF2-40B4-BE49-F238E27FC236}">
-                <a16:creationId xmlns:a16="http://schemas.microsoft.com/office/drawing/2014/main" id="{D6DC0C66-5058-527E-0476-DFD8CBC8D526}"/>
-              </a:ext>
-            </a:extLst>
-          </p:cNvPr>
-          <p:cNvSpPr>
-            <a:spLocks noGrp="1"/>
-          </p:cNvSpPr>
-          <p:nvPr>
-            <p:ph type="title"/>
-          </p:nvPr>
-        </p:nvSpPr>
-        <p:spPr>
-          <a:xfrm>
-            <a:off x="720000" y="619200"/>
-            <a:ext cx="10728322" cy="704775"/>
-          </a:xfrm>
-        </p:spPr>
-        <p:txBody>
-          <a:bodyPr/>
-          <a:lstStyle/>
-          <a:p>
-            <a:r>
-              <a:rPr lang="en-US" dirty="0"/>
-              <a:t>REFERENCES</a:t>
-            </a:r>
-          </a:p>
-        </p:txBody>
-      </p:sp>
-      <p:sp>
-        <p:nvSpPr>
-          <p:cNvPr id="3" name="Content Placeholder 2">
-            <a:extLst>
-              <a:ext uri="{FF2B5EF4-FFF2-40B4-BE49-F238E27FC236}">
-                <a16:creationId xmlns:a16="http://schemas.microsoft.com/office/drawing/2014/main" id="{CF1D7140-A46C-9DCA-2EA8-ABE5FCC0FBEF}"/>
-              </a:ext>
-            </a:extLst>
-          </p:cNvPr>
-          <p:cNvSpPr>
-            <a:spLocks noGrp="1"/>
-          </p:cNvSpPr>
-          <p:nvPr>
-            <p:ph idx="1"/>
-          </p:nvPr>
-        </p:nvSpPr>
-        <p:spPr>
-          <a:xfrm>
-            <a:off x="720000" y="1685926"/>
-            <a:ext cx="10728325" cy="4083050"/>
-          </a:xfrm>
-        </p:spPr>
-        <p:txBody>
-          <a:bodyPr/>
-          <a:lstStyle/>
-          <a:p>
-            <a:r>
-              <a:rPr lang="en-US" dirty="0"/>
-              <a:t>USDA, 2023</a:t>
+              <a:t>2009-2011 food insecurity data </a:t>
             </a:r>
           </a:p>
           <a:p>
             <a:r>
               <a:rPr lang="en-US" b="0" i="0" u="none" strike="noStrike" dirty="0">
+                <a:solidFill>
+                  <a:schemeClr val="tx1"/>
+                </a:solidFill>
                 <a:effectLst/>
-                <a:latin typeface="-apple-system"/>
-                <a:hlinkClick r:id="rId2"/>
+                <a:latin typeface="Slack-Lato"/>
+                <a:hlinkClick r:id="rId2">
+                  <a:extLst>
+                    <a:ext uri="{A12FA001-AC4F-418D-AE19-62706E023703}">
+                      <ahyp:hlinkClr xmlns:ahyp="http://schemas.microsoft.com/office/drawing/2018/hyperlinkcolor" val="tx"/>
+                    </a:ext>
+                  </a:extLst>
+                </a:hlinkClick>
               </a:rPr>
               <a:t>https://www.ers.usda.gov/webdocs/publications/45020/30967_err141.pdf</a:t>
             </a:r>
             <a:endParaRPr lang="en-US" b="0" i="0" u="none" strike="noStrike" dirty="0">
+              <a:solidFill>
+                <a:schemeClr val="tx1"/>
+              </a:solidFill>
               <a:effectLst/>
-              <a:latin typeface="-apple-system"/>
+              <a:latin typeface="Slack-Lato"/>
             </a:endParaRPr>
           </a:p>
           <a:p>
-            <a:r>
+            <a:br>
               <a:rPr lang="en-US" dirty="0">
-                <a:hlinkClick r:id="rId3"/>
+                <a:solidFill>
+                  <a:schemeClr val="tx1"/>
+                </a:solidFill>
               </a:rPr>
-              <a:t>USDA ERS - Data Access and Documentation Downloads</a:t>
+            </a:br>
+            <a:r>
+              <a:rPr lang="en-US" b="0" i="0" dirty="0">
+                <a:solidFill>
+                  <a:schemeClr val="tx1"/>
+                </a:solidFill>
+                <a:effectLst/>
+                <a:latin typeface="Slack-Lato"/>
+              </a:rPr>
+              <a:t>2011-2013 food insecurity data </a:t>
+            </a:r>
+            <a:r>
+              <a:rPr lang="en-US" b="0" i="0" u="none" strike="noStrike" dirty="0">
+                <a:solidFill>
+                  <a:schemeClr val="tx1"/>
+                </a:solidFill>
+                <a:effectLst/>
+                <a:latin typeface="Slack-Lato"/>
+                <a:hlinkClick r:id="rId5">
+                  <a:extLst>
+                    <a:ext uri="{A12FA001-AC4F-418D-AE19-62706E023703}">
+                      <ahyp:hlinkClr xmlns:ahyp="http://schemas.microsoft.com/office/drawing/2018/hyperlinkcolor" val="tx"/>
+                    </a:ext>
+                  </a:extLst>
+                </a:hlinkClick>
+              </a:rPr>
+              <a:t>https://www.ers.usda.gov/webdocs/publications/45265/48787_err173.pdf</a:t>
+            </a:r>
+            <a:endParaRPr lang="en-US" b="0" i="0" u="none" strike="noStrike" dirty="0">
+              <a:solidFill>
+                <a:schemeClr val="tx1"/>
+              </a:solidFill>
+              <a:effectLst/>
+              <a:latin typeface="Slack-Lato"/>
+            </a:endParaRPr>
+          </a:p>
+          <a:p>
+            <a:br>
+              <a:rPr lang="en-US" dirty="0">
+                <a:solidFill>
+                  <a:schemeClr val="tx1"/>
+                </a:solidFill>
+              </a:rPr>
+            </a:br>
+            <a:r>
+              <a:rPr lang="en-US" b="0" i="0" dirty="0">
+                <a:solidFill>
+                  <a:schemeClr val="tx1"/>
+                </a:solidFill>
+                <a:effectLst/>
+                <a:latin typeface="Slack-Lato"/>
+              </a:rPr>
+              <a:t>2014-2016 food insecurity data </a:t>
+            </a:r>
+            <a:r>
+              <a:rPr lang="en-US" b="0" i="0" u="none" strike="noStrike" dirty="0">
+                <a:solidFill>
+                  <a:schemeClr val="tx1"/>
+                </a:solidFill>
+                <a:effectLst/>
+                <a:latin typeface="Slack-Lato"/>
+                <a:hlinkClick r:id="rId6">
+                  <a:extLst>
+                    <a:ext uri="{A12FA001-AC4F-418D-AE19-62706E023703}">
+                      <ahyp:hlinkClr xmlns:ahyp="http://schemas.microsoft.com/office/drawing/2018/hyperlinkcolor" val="tx"/>
+                    </a:ext>
+                  </a:extLst>
+                </a:hlinkClick>
+              </a:rPr>
+              <a:t>https://www.ers.usda.gov/webdocs/publications/84973/err-237.pdf?v=219.4</a:t>
             </a:r>
             <a:endParaRPr lang="en-US" dirty="0">
+              <a:solidFill>
+                <a:schemeClr val="tx1"/>
+              </a:solidFill>
               <a:latin typeface="-apple-system"/>
             </a:endParaRPr>
           </a:p>
@@ -4927,7 +4747,7 @@
             </a:pPr>
             <a:r>
               <a:rPr lang="en-US" dirty="0"/>
-              <a:t>Based on the increasing rate of inflation following the COVID-19 Pandemic, how secure are household in the USA? </a:t>
+              <a:t>Based on the increasing rate of inflation following the recent global events, how secure are households in the USA? </a:t>
             </a:r>
           </a:p>
           <a:p>
@@ -5375,18 +5195,25 @@
         <p:spPr>
           <a:xfrm>
             <a:off x="720000" y="619200"/>
-            <a:ext cx="6923813" cy="739775"/>
+            <a:ext cx="8412570" cy="864367"/>
           </a:xfrm>
         </p:spPr>
         <p:txBody>
           <a:bodyPr>
-            <a:normAutofit/>
+            <a:normAutofit fontScale="90000"/>
           </a:bodyPr>
           <a:lstStyle/>
           <a:p>
             <a:r>
               <a:rPr lang="en-US" dirty="0"/>
-              <a:t>DESCRIPTION OF DATA</a:t>
+              <a:t>DESCRIPTION OF DATA :  RESTAURANT DATA</a:t>
+            </a:r>
+            <a:br>
+              <a:rPr lang="en-US" dirty="0"/>
+            </a:br>
+            <a:r>
+              <a:rPr lang="en-US" dirty="0"/>
+              <a:t>(X-FEATURE )</a:t>
             </a:r>
           </a:p>
         </p:txBody>
@@ -5409,8 +5236,8 @@
         </p:nvSpPr>
         <p:spPr>
           <a:xfrm>
-            <a:off x="720000" y="1666876"/>
-            <a:ext cx="10716487" cy="4102100"/>
+            <a:off x="720000" y="1977390"/>
+            <a:ext cx="10716487" cy="3791586"/>
           </a:xfrm>
         </p:spPr>
         <p:txBody>
@@ -5419,7 +5246,46 @@
           </a:bodyPr>
           <a:lstStyle/>
           <a:p>
-            <a:endParaRPr lang="en-US" sz="4800" dirty="0"/>
+            <a:pPr marL="0" indent="0">
+              <a:buNone/>
+            </a:pPr>
+            <a:r>
+              <a:rPr lang="en-US" sz="3000" dirty="0"/>
+              <a:t>Fast-food restaurants/1,000 pop (% change), 2011-16         </a:t>
+            </a:r>
+          </a:p>
+          <a:p>
+            <a:pPr marL="0" indent="0">
+              <a:buNone/>
+            </a:pPr>
+            <a:r>
+              <a:rPr lang="en-US" sz="3000" dirty="0"/>
+              <a:t>Full-service restaurants/1,000 pop (% change), 2011-16</a:t>
+            </a:r>
+          </a:p>
+          <a:p>
+            <a:pPr marL="0" indent="0">
+              <a:buNone/>
+            </a:pPr>
+            <a:r>
+              <a:rPr lang="en-US" sz="3000" dirty="0"/>
+              <a:t>Expenditures per capita, fast food, (% change) 2007-12       </a:t>
+            </a:r>
+          </a:p>
+          <a:p>
+            <a:pPr marL="0" indent="0">
+              <a:buNone/>
+            </a:pPr>
+            <a:r>
+              <a:rPr lang="en-US" sz="3000" dirty="0"/>
+              <a:t>Expenditures per capita, restaurants, (% change) 2007-12     </a:t>
+            </a:r>
+          </a:p>
+          <a:p>
+            <a:pPr marL="0" indent="0">
+              <a:buNone/>
+            </a:pPr>
+            <a:endParaRPr lang="en-US" sz="3000" dirty="0"/>
           </a:p>
         </p:txBody>
       </p:sp>
@@ -5463,7 +5329,7 @@
       </p:grpSpPr>
       <p:sp useBgFill="1">
         <p:nvSpPr>
-          <p:cNvPr id="19" name="Rectangle 18">
+          <p:cNvPr id="16" name="Rectangle 7">
             <a:extLst>
               <a:ext uri="{FF2B5EF4-FFF2-40B4-BE49-F238E27FC236}">
                 <a16:creationId xmlns:a16="http://schemas.microsoft.com/office/drawing/2014/main" id="{AFAE2A12-140C-4527-B721-72C1DD3FC66D}"/>
@@ -5526,7 +5392,7 @@
       </p:sp>
       <p:sp>
         <p:nvSpPr>
-          <p:cNvPr id="21" name="Rectangle 20">
+          <p:cNvPr id="17" name="Rectangle 9">
             <a:extLst>
               <a:ext uri="{FF2B5EF4-FFF2-40B4-BE49-F238E27FC236}">
                 <a16:creationId xmlns:a16="http://schemas.microsoft.com/office/drawing/2014/main" id="{A5B43FC7-6A19-4DF3-8506-485B555007D9}"/>
@@ -5595,7 +5461,7 @@
       </p:sp>
       <p:sp>
         <p:nvSpPr>
-          <p:cNvPr id="23" name="Freeform: Shape 22">
+          <p:cNvPr id="18" name="Freeform: Shape 11">
             <a:extLst>
               <a:ext uri="{FF2B5EF4-FFF2-40B4-BE49-F238E27FC236}">
                 <a16:creationId xmlns:a16="http://schemas.microsoft.com/office/drawing/2014/main" id="{7E689040-6301-4CD3-A20F-EA809EAD514F}"/>
@@ -5782,7 +5648,7 @@
           <a:p>
             <a:r>
               <a:rPr lang="en-US" dirty="0"/>
-              <a:t>DESCRIPTION OF DATA</a:t>
+              <a:t>DESCRIPTION OF DATA: STORES DATA (X-FEATURE)</a:t>
             </a:r>
           </a:p>
         </p:txBody>
@@ -5805,24 +5671,69 @@
         </p:nvSpPr>
         <p:spPr>
           <a:xfrm>
-            <a:off x="720000" y="1409700"/>
-            <a:ext cx="10716487" cy="4359275"/>
+            <a:off x="737756" y="2022400"/>
+            <a:ext cx="10716487" cy="4216400"/>
           </a:xfrm>
         </p:spPr>
         <p:txBody>
           <a:bodyPr>
-            <a:normAutofit/>
+            <a:normAutofit fontScale="70000" lnSpcReduction="20000"/>
           </a:bodyPr>
           <a:lstStyle/>
           <a:p>
-            <a:endParaRPr lang="en-US" sz="4800"/>
+            <a:pPr marL="0" indent="0">
+              <a:buNone/>
+            </a:pPr>
+            <a:r>
+              <a:rPr lang="en-US" sz="4800" dirty="0"/>
+              <a:t>VARIABLES </a:t>
+            </a:r>
+          </a:p>
+          <a:p>
+            <a:pPr marL="0" indent="0">
+              <a:buNone/>
+            </a:pPr>
+            <a:r>
+              <a:rPr lang="en-US" sz="4800" dirty="0"/>
+              <a:t>Grocery stores/1,000 pop (% change), 2011-16                </a:t>
+            </a:r>
+          </a:p>
+          <a:p>
+            <a:pPr marL="0" indent="0">
+              <a:buNone/>
+            </a:pPr>
+            <a:r>
+              <a:rPr lang="en-US" sz="4800" dirty="0"/>
+              <a:t>Supercenters &amp; club stores/1,000 pop (% change), 2011-16    </a:t>
+            </a:r>
+          </a:p>
+          <a:p>
+            <a:pPr marL="0" indent="0">
+              <a:buNone/>
+            </a:pPr>
+            <a:r>
+              <a:rPr lang="en-US" sz="4800" dirty="0"/>
+              <a:t>Convenience stores/1,000 pop (% change), 2011-16            </a:t>
+            </a:r>
+          </a:p>
+          <a:p>
+            <a:pPr marL="0" indent="0">
+              <a:buNone/>
+            </a:pPr>
+            <a:r>
+              <a:rPr lang="en-US" sz="4800" dirty="0"/>
+              <a:t>Specialized food stores/1,000 pop (% change), 2011-16       </a:t>
+            </a:r>
+          </a:p>
+          <a:p>
+            <a:endParaRPr lang="en-US" sz="4800" dirty="0"/>
           </a:p>
         </p:txBody>
       </p:sp>
     </p:spTree>
     <p:extLst>
       <p:ext uri="{BB962C8B-B14F-4D97-AF65-F5344CB8AC3E}">
-        <p14:creationId xmlns:p14="http://schemas.microsoft.com/office/powerpoint/2010/main" val="3993256667"/>
+        <p14:creationId xmlns:p14="http://schemas.microsoft.com/office/powerpoint/2010/main" val="2073011280"/>
       </p:ext>
     </p:extLst>
   </p:cSld>
@@ -5859,7 +5770,7 @@
       </p:grpSpPr>
       <p:sp useBgFill="1">
         <p:nvSpPr>
-          <p:cNvPr id="16" name="Rectangle 7">
+          <p:cNvPr id="19" name="Rectangle 18">
             <a:extLst>
               <a:ext uri="{FF2B5EF4-FFF2-40B4-BE49-F238E27FC236}">
                 <a16:creationId xmlns:a16="http://schemas.microsoft.com/office/drawing/2014/main" id="{AFAE2A12-140C-4527-B721-72C1DD3FC66D}"/>
@@ -5922,7 +5833,7 @@
       </p:sp>
       <p:sp>
         <p:nvSpPr>
-          <p:cNvPr id="17" name="Rectangle 9">
+          <p:cNvPr id="21" name="Rectangle 20">
             <a:extLst>
               <a:ext uri="{FF2B5EF4-FFF2-40B4-BE49-F238E27FC236}">
                 <a16:creationId xmlns:a16="http://schemas.microsoft.com/office/drawing/2014/main" id="{A5B43FC7-6A19-4DF3-8506-485B555007D9}"/>
@@ -5991,7 +5902,7 @@
       </p:sp>
       <p:sp>
         <p:nvSpPr>
-          <p:cNvPr id="18" name="Freeform: Shape 11">
+          <p:cNvPr id="23" name="Freeform: Shape 22">
             <a:extLst>
               <a:ext uri="{FF2B5EF4-FFF2-40B4-BE49-F238E27FC236}">
                 <a16:creationId xmlns:a16="http://schemas.microsoft.com/office/drawing/2014/main" id="{7E689040-6301-4CD3-A20F-EA809EAD514F}"/>
@@ -6167,7 +6078,7 @@
         <p:spPr>
           <a:xfrm>
             <a:off x="720000" y="619200"/>
-            <a:ext cx="6923813" cy="1477328"/>
+            <a:ext cx="9095804" cy="1237592"/>
           </a:xfrm>
         </p:spPr>
         <p:txBody>
@@ -6178,7 +6089,7 @@
           <a:p>
             <a:r>
               <a:rPr lang="en-US" dirty="0"/>
-              <a:t>DESCRIPTION OF DATA</a:t>
+              <a:t>DESCRIPTION OF DATA: INSECURITY DATA(Y)</a:t>
             </a:r>
           </a:p>
         </p:txBody>
@@ -6201,8 +6112,8 @@
         </p:nvSpPr>
         <p:spPr>
           <a:xfrm>
-            <a:off x="720000" y="1552576"/>
-            <a:ext cx="10716487" cy="4216400"/>
+            <a:off x="720000" y="1856792"/>
+            <a:ext cx="10716487" cy="3912183"/>
           </a:xfrm>
         </p:spPr>
         <p:txBody>
@@ -6211,14 +6122,36 @@
           </a:bodyPr>
           <a:lstStyle/>
           <a:p>
-            <a:endParaRPr lang="en-US" sz="4800" dirty="0"/>
+            <a:r>
+              <a:rPr lang="en-US" sz="3000" dirty="0"/>
+              <a:t>Household food insecurity (%, three-year average), 2017-19* </a:t>
+            </a:r>
+          </a:p>
+          <a:p>
+            <a:r>
+              <a:rPr lang="en-US" sz="3000" dirty="0"/>
+              <a:t>Household food insecurity (change %),2014-16 to 2017-19* </a:t>
+            </a:r>
+          </a:p>
+          <a:p>
+            <a:r>
+              <a:rPr lang="en-US" sz="3000" dirty="0" err="1"/>
+              <a:t>BI_Model</a:t>
+            </a:r>
+            <a:r>
+              <a:rPr lang="en-US" sz="3000" dirty="0"/>
+              <a:t>-Household food insecurity (change %),2014-16 to 2017-19*</a:t>
+            </a:r>
+          </a:p>
+          <a:p>
+            <a:endParaRPr lang="en-US" sz="3200" dirty="0"/>
           </a:p>
         </p:txBody>
       </p:sp>
     </p:spTree>
     <p:extLst>
       <p:ext uri="{BB962C8B-B14F-4D97-AF65-F5344CB8AC3E}">
-        <p14:creationId xmlns:p14="http://schemas.microsoft.com/office/powerpoint/2010/main" val="2073011280"/>
+        <p14:creationId xmlns:p14="http://schemas.microsoft.com/office/powerpoint/2010/main" val="3993256667"/>
       </p:ext>
     </p:extLst>
   </p:cSld>
@@ -6561,7 +6494,7 @@
         <p:spPr>
           <a:xfrm>
             <a:off x="328114" y="2240890"/>
-            <a:ext cx="7005747" cy="3416320"/>
+            <a:ext cx="7005747" cy="3754874"/>
           </a:xfrm>
           <a:prstGeom prst="rect">
             <a:avLst/>
@@ -6590,7 +6523,7 @@
                 <a:effectLst/>
                 <a:latin typeface="-apple-system"/>
               </a:rPr>
-              <a:t>How does physical access to food through restaurants, grocery stores and agriculture impact food insecurity?</a:t>
+              <a:t>How does physical access to food through restaurants and  grocery stores impact food insecurity?</a:t>
             </a:r>
           </a:p>
           <a:p>
@@ -6608,6 +6541,19 @@
                 <a:latin typeface="-apple-system"/>
               </a:rPr>
               <a:t>Sub Hypotheses:</a:t>
+            </a:r>
+          </a:p>
+          <a:p>
+            <a:pPr algn="l">
+              <a:buFont typeface="Arial" panose="020B0604020202020204" pitchFamily="34" charset="0"/>
+              <a:buChar char="•"/>
+            </a:pPr>
+            <a:r>
+              <a:rPr lang="en-US" sz="2200" b="0" i="0" dirty="0">
+                <a:effectLst/>
+                <a:latin typeface="-apple-system"/>
+              </a:rPr>
+              <a:t>How is fast-food expenditure related to food insecurity?</a:t>
             </a:r>
           </a:p>
           <a:p>
@@ -7068,7 +7014,7 @@
         </p:nvSpPr>
         <p:spPr>
           <a:xfrm>
-            <a:off x="500924" y="358050"/>
+            <a:off x="410289" y="190099"/>
             <a:ext cx="6433276" cy="2175600"/>
           </a:xfrm>
         </p:spPr>
@@ -7202,10 +7148,72 @@
                 <a:spcPct val="90000"/>
               </a:lnSpc>
             </a:pPr>
-            <a:r>
-              <a:rPr lang="en-US" sz="4800" spc="-100" dirty="0"/>
-              <a:t>DESCRIPTION OF DATA EXPLORATION PHASE</a:t>
-            </a:r>
+            <a:endParaRPr lang="en-US" sz="2400" spc="-100" dirty="0"/>
+          </a:p>
+        </p:txBody>
+      </p:sp>
+      <p:sp>
+        <p:nvSpPr>
+          <p:cNvPr id="5" name="TextBox 4">
+            <a:extLst>
+              <a:ext uri="{FF2B5EF4-FFF2-40B4-BE49-F238E27FC236}">
+                <a16:creationId xmlns:a16="http://schemas.microsoft.com/office/drawing/2014/main" id="{A33518C2-4DF5-27AA-F948-398102DEE22E}"/>
+              </a:ext>
+            </a:extLst>
+          </p:cNvPr>
+          <p:cNvSpPr txBox="1"/>
+          <p:nvPr/>
+        </p:nvSpPr>
+        <p:spPr>
+          <a:xfrm>
+            <a:off x="668784" y="2966344"/>
+            <a:ext cx="6562439" cy="3693319"/>
+          </a:xfrm>
+          <a:prstGeom prst="rect">
+            <a:avLst/>
+          </a:prstGeom>
+          <a:noFill/>
+        </p:spPr>
+        <p:txBody>
+          <a:bodyPr wrap="square">
+            <a:spAutoFit/>
+          </a:bodyPr>
+          <a:lstStyle/>
+          <a:p>
+            <a:r>
+              <a:rPr lang="en-US" dirty="0"/>
+              <a:t>Data was reviewed from the USDA website regarding food insecurity and was transformed and cleaned to be analyzed by Team 6 members. </a:t>
+            </a:r>
+          </a:p>
+          <a:p>
+            <a:endParaRPr lang="en-US" dirty="0"/>
+          </a:p>
+          <a:p>
+            <a:r>
+              <a:rPr lang="en-US" dirty="0"/>
+              <a:t>The team refined the feature variables to restaurants and stores. Using these feature variables, the team members intend to predict future food insecurity.</a:t>
+            </a:r>
+          </a:p>
+          <a:p>
+            <a:endParaRPr lang="en-US" dirty="0"/>
+          </a:p>
+          <a:p>
+            <a:r>
+              <a:rPr lang="en-US" dirty="0"/>
+              <a:t>The feature variables refer to data covering the duration from 2007 to 2016.</a:t>
+            </a:r>
+          </a:p>
+          <a:p>
+            <a:endParaRPr lang="en-US" dirty="0"/>
+          </a:p>
+          <a:p>
+            <a:r>
+              <a:rPr lang="en-US" dirty="0"/>
+              <a:t>The predictor variable is food insecurity from 2017 to 2019.</a:t>
+            </a:r>
+          </a:p>
+          <a:p>
+            <a:endParaRPr lang="en-US" dirty="0"/>
           </a:p>
         </p:txBody>
       </p:sp>
@@ -7252,480 +7260,6 @@
           <p:cNvPr id="12" name="Rectangle 11">
             <a:extLst>
               <a:ext uri="{FF2B5EF4-FFF2-40B4-BE49-F238E27FC236}">
-                <a16:creationId xmlns:a16="http://schemas.microsoft.com/office/drawing/2014/main" id="{1D1CCC3C-EB52-47ED-B6AA-5F70D9215594}"/>
-              </a:ext>
-              <a:ext uri="{C183D7F6-B498-43B3-948B-1728B52AA6E4}">
-                <adec:decorative xmlns:adec="http://schemas.microsoft.com/office/drawing/2017/decorative" val="1"/>
-              </a:ext>
-            </a:extLst>
-          </p:cNvPr>
-          <p:cNvSpPr>
-            <a:spLocks noGrp="1" noRot="1" noChangeAspect="1" noMove="1" noResize="1" noEditPoints="1" noAdjustHandles="1" noChangeArrowheads="1" noChangeShapeType="1" noTextEdit="1"/>
-          </p:cNvSpPr>
-          <p:nvPr>
-            <p:extLst>
-              <p:ext uri="{386F3935-93C4-4BCD-93E2-E3B085C9AB24}">
-                <p16:designElem xmlns:p16="http://schemas.microsoft.com/office/powerpoint/2015/main" val="1"/>
-              </p:ext>
-            </p:extLst>
-          </p:nvPr>
-        </p:nvSpPr>
-        <p:spPr>
-          <a:xfrm>
-            <a:off x="0" y="0"/>
-            <a:ext cx="12192000" cy="6858000"/>
-          </a:xfrm>
-          <a:prstGeom prst="rect">
-            <a:avLst/>
-          </a:prstGeom>
-          <a:ln w="12700" cap="flat" cmpd="sng" algn="ctr">
-            <a:noFill/>
-            <a:prstDash val="solid"/>
-            <a:miter lim="800000"/>
-          </a:ln>
-          <a:effectLst/>
-        </p:spPr>
-        <p:style>
-          <a:lnRef idx="2">
-            <a:schemeClr val="accent1">
-              <a:shade val="50000"/>
-            </a:schemeClr>
-          </a:lnRef>
-          <a:fillRef idx="1">
-            <a:schemeClr val="accent1"/>
-          </a:fillRef>
-          <a:effectRef idx="0">
-            <a:schemeClr val="accent1"/>
-          </a:effectRef>
-          <a:fontRef idx="minor">
-            <a:schemeClr val="lt1"/>
-          </a:fontRef>
-        </p:style>
-        <p:txBody>
-          <a:bodyPr rtlCol="0" anchor="ctr"/>
-          <a:lstStyle/>
-          <a:p>
-            <a:pPr algn="ctr"/>
-            <a:endParaRPr lang="en-US"/>
-          </a:p>
-        </p:txBody>
-      </p:sp>
-      <p:sp>
-        <p:nvSpPr>
-          <p:cNvPr id="14" name="Rectangle 13">
-            <a:extLst>
-              <a:ext uri="{FF2B5EF4-FFF2-40B4-BE49-F238E27FC236}">
-                <a16:creationId xmlns:a16="http://schemas.microsoft.com/office/drawing/2014/main" id="{384C50CF-FE9D-459C-890F-56C327795D02}"/>
-              </a:ext>
-              <a:ext uri="{C183D7F6-B498-43B3-948B-1728B52AA6E4}">
-                <adec:decorative xmlns:adec="http://schemas.microsoft.com/office/drawing/2017/decorative" val="1"/>
-              </a:ext>
-            </a:extLst>
-          </p:cNvPr>
-          <p:cNvSpPr>
-            <a:spLocks noGrp="1" noRot="1" noChangeAspect="1" noMove="1" noResize="1" noEditPoints="1" noAdjustHandles="1" noChangeArrowheads="1" noChangeShapeType="1" noTextEdit="1"/>
-          </p:cNvSpPr>
-          <p:nvPr>
-            <p:extLst>
-              <p:ext uri="{386F3935-93C4-4BCD-93E2-E3B085C9AB24}">
-                <p16:designElem xmlns:p16="http://schemas.microsoft.com/office/powerpoint/2015/main" val="1"/>
-              </p:ext>
-            </p:extLst>
-          </p:nvPr>
-        </p:nvSpPr>
-        <p:spPr>
-          <a:xfrm>
-            <a:off x="0" y="0"/>
-            <a:ext cx="12192000" cy="6858000"/>
-          </a:xfrm>
-          <a:prstGeom prst="rect">
-            <a:avLst/>
-          </a:prstGeom>
-          <a:solidFill>
-            <a:schemeClr val="bg2">
-              <a:lumMod val="90000"/>
-              <a:lumOff val="10000"/>
-            </a:schemeClr>
-          </a:solidFill>
-          <a:ln w="12700" cap="flat" cmpd="sng" algn="ctr">
-            <a:noFill/>
-            <a:prstDash val="solid"/>
-            <a:miter lim="800000"/>
-          </a:ln>
-          <a:effectLst/>
-        </p:spPr>
-        <p:style>
-          <a:lnRef idx="2">
-            <a:schemeClr val="accent1">
-              <a:shade val="50000"/>
-            </a:schemeClr>
-          </a:lnRef>
-          <a:fillRef idx="1">
-            <a:schemeClr val="accent1"/>
-          </a:fillRef>
-          <a:effectRef idx="0">
-            <a:schemeClr val="accent1"/>
-          </a:effectRef>
-          <a:fontRef idx="minor">
-            <a:schemeClr val="lt1"/>
-          </a:fontRef>
-        </p:style>
-        <p:txBody>
-          <a:bodyPr rtlCol="0" anchor="ctr"/>
-          <a:lstStyle/>
-          <a:p>
-            <a:pPr algn="ctr"/>
-            <a:endParaRPr lang="en-US"/>
-          </a:p>
-        </p:txBody>
-      </p:sp>
-      <p:sp useBgFill="1">
-        <p:nvSpPr>
-          <p:cNvPr id="16" name="Freeform: Shape 15">
-            <a:extLst>
-              <a:ext uri="{FF2B5EF4-FFF2-40B4-BE49-F238E27FC236}">
-                <a16:creationId xmlns:a16="http://schemas.microsoft.com/office/drawing/2014/main" id="{79C4E6F9-8A11-4E94-8423-966E9DF0D85A}"/>
-              </a:ext>
-              <a:ext uri="{C183D7F6-B498-43B3-948B-1728B52AA6E4}">
-                <adec:decorative xmlns:adec="http://schemas.microsoft.com/office/drawing/2017/decorative" val="1"/>
-              </a:ext>
-            </a:extLst>
-          </p:cNvPr>
-          <p:cNvSpPr>
-            <a:spLocks noGrp="1" noRot="1" noChangeAspect="1" noMove="1" noResize="1" noEditPoints="1" noAdjustHandles="1" noChangeArrowheads="1" noChangeShapeType="1" noTextEdit="1"/>
-          </p:cNvSpPr>
-          <p:nvPr>
-            <p:extLst>
-              <p:ext uri="{386F3935-93C4-4BCD-93E2-E3B085C9AB24}">
-                <p16:designElem xmlns:p16="http://schemas.microsoft.com/office/powerpoint/2015/main" val="1"/>
-              </p:ext>
-            </p:extLst>
-          </p:nvPr>
-        </p:nvSpPr>
-        <p:spPr>
-          <a:xfrm>
-            <a:off x="1" y="0"/>
-            <a:ext cx="11096624" cy="6858000"/>
-          </a:xfrm>
-          <a:custGeom>
-            <a:avLst/>
-            <a:gdLst>
-              <a:gd name="connsiteX0" fmla="*/ 0 w 11096624"/>
-              <a:gd name="connsiteY0" fmla="*/ 0 h 6858000"/>
-              <a:gd name="connsiteX1" fmla="*/ 10869306 w 11096624"/>
-              <a:gd name="connsiteY1" fmla="*/ 0 h 6858000"/>
-              <a:gd name="connsiteX2" fmla="*/ 10932108 w 11096624"/>
-              <a:gd name="connsiteY2" fmla="*/ 181114 h 6858000"/>
-              <a:gd name="connsiteX3" fmla="*/ 10953136 w 11096624"/>
-              <a:gd name="connsiteY3" fmla="*/ 3620675 h 6858000"/>
-              <a:gd name="connsiteX4" fmla="*/ 9722723 w 11096624"/>
-              <a:gd name="connsiteY4" fmla="*/ 6351879 h 6858000"/>
-              <a:gd name="connsiteX5" fmla="*/ 9365083 w 11096624"/>
-              <a:gd name="connsiteY5" fmla="*/ 6847267 h 6858000"/>
-              <a:gd name="connsiteX6" fmla="*/ 9354506 w 11096624"/>
-              <a:gd name="connsiteY6" fmla="*/ 6858000 h 6858000"/>
-              <a:gd name="connsiteX7" fmla="*/ 0 w 11096624"/>
-              <a:gd name="connsiteY7" fmla="*/ 6858000 h 6858000"/>
-            </a:gdLst>
-            <a:ahLst/>
-            <a:cxnLst>
-              <a:cxn ang="0">
-                <a:pos x="connsiteX0" y="connsiteY0"/>
-              </a:cxn>
-              <a:cxn ang="0">
-                <a:pos x="connsiteX1" y="connsiteY1"/>
-              </a:cxn>
-              <a:cxn ang="0">
-                <a:pos x="connsiteX2" y="connsiteY2"/>
-              </a:cxn>
-              <a:cxn ang="0">
-                <a:pos x="connsiteX3" y="connsiteY3"/>
-              </a:cxn>
-              <a:cxn ang="0">
-                <a:pos x="connsiteX4" y="connsiteY4"/>
-              </a:cxn>
-              <a:cxn ang="0">
-                <a:pos x="connsiteX5" y="connsiteY5"/>
-              </a:cxn>
-              <a:cxn ang="0">
-                <a:pos x="connsiteX6" y="connsiteY6"/>
-              </a:cxn>
-              <a:cxn ang="0">
-                <a:pos x="connsiteX7" y="connsiteY7"/>
-              </a:cxn>
-            </a:cxnLst>
-            <a:rect l="l" t="t" r="r" b="b"/>
-            <a:pathLst>
-              <a:path w="11096624" h="6858000">
-                <a:moveTo>
-                  <a:pt x="0" y="0"/>
-                </a:moveTo>
-                <a:lnTo>
-                  <a:pt x="10869306" y="0"/>
-                </a:lnTo>
-                <a:lnTo>
-                  <a:pt x="10932108" y="181114"/>
-                </a:lnTo>
-                <a:cubicBezTo>
-                  <a:pt x="11289577" y="1409141"/>
-                  <a:pt x="10953136" y="3273767"/>
-                  <a:pt x="10953136" y="3620675"/>
-                </a:cubicBezTo>
-                <a:cubicBezTo>
-                  <a:pt x="10953136" y="5162483"/>
-                  <a:pt x="10118214" y="5735156"/>
-                  <a:pt x="9722723" y="6351879"/>
-                </a:cubicBezTo>
-                <a:cubicBezTo>
-                  <a:pt x="9656808" y="6500554"/>
-                  <a:pt x="9530643" y="6669361"/>
-                  <a:pt x="9365083" y="6847267"/>
-                </a:cubicBezTo>
-                <a:lnTo>
-                  <a:pt x="9354506" y="6858000"/>
-                </a:lnTo>
-                <a:lnTo>
-                  <a:pt x="0" y="6858000"/>
-                </a:lnTo>
-                <a:close/>
-              </a:path>
-            </a:pathLst>
-          </a:custGeom>
-          <a:ln>
-            <a:noFill/>
-          </a:ln>
-        </p:spPr>
-        <p:txBody>
-          <a:bodyPr vert="horz" wrap="square" lIns="91440" tIns="45720" rIns="91440" bIns="45720" numCol="1" anchor="t" anchorCtr="0" compatLnSpc="1">
-            <a:prstTxWarp prst="textNoShape">
-              <a:avLst/>
-            </a:prstTxWarp>
-            <a:noAutofit/>
-          </a:bodyPr>
-          <a:lstStyle/>
-          <a:p>
-            <a:endParaRPr lang="en-US">
-              <a:solidFill>
-                <a:schemeClr val="tx1"/>
-              </a:solidFill>
-            </a:endParaRPr>
-          </a:p>
-        </p:txBody>
-      </p:sp>
-      <p:sp>
-        <p:nvSpPr>
-          <p:cNvPr id="2" name="Title 1">
-            <a:extLst>
-              <a:ext uri="{FF2B5EF4-FFF2-40B4-BE49-F238E27FC236}">
-                <a16:creationId xmlns:a16="http://schemas.microsoft.com/office/drawing/2014/main" id="{F3A98463-C630-BF2A-FB96-F388FA66AB92}"/>
-              </a:ext>
-            </a:extLst>
-          </p:cNvPr>
-          <p:cNvSpPr>
-            <a:spLocks noGrp="1"/>
-          </p:cNvSpPr>
-          <p:nvPr>
-            <p:ph type="title"/>
-          </p:nvPr>
-        </p:nvSpPr>
-        <p:spPr>
-          <a:xfrm>
-            <a:off x="720000" y="619200"/>
-            <a:ext cx="6923812" cy="1477328"/>
-          </a:xfrm>
-        </p:spPr>
-        <p:txBody>
-          <a:bodyPr vert="horz" wrap="square" lIns="0" tIns="0" rIns="0" bIns="0" rtlCol="0" anchor="ctr" anchorCtr="0">
-            <a:normAutofit/>
-          </a:bodyPr>
-          <a:lstStyle/>
-          <a:p>
-            <a:r>
-              <a:rPr lang="en-US" spc="-100"/>
-              <a:t>DESCRIPTION OF DATA EXPLORATION PHASE</a:t>
-            </a:r>
-          </a:p>
-        </p:txBody>
-      </p:sp>
-      <p:sp>
-        <p:nvSpPr>
-          <p:cNvPr id="4" name="Title 1">
-            <a:extLst>
-              <a:ext uri="{FF2B5EF4-FFF2-40B4-BE49-F238E27FC236}">
-                <a16:creationId xmlns:a16="http://schemas.microsoft.com/office/drawing/2014/main" id="{846DF3D3-40C9-EC01-CD6C-32D42B01B659}"/>
-              </a:ext>
-            </a:extLst>
-          </p:cNvPr>
-          <p:cNvSpPr txBox="1">
-            <a:spLocks/>
-          </p:cNvSpPr>
-          <p:nvPr/>
-        </p:nvSpPr>
-        <p:spPr>
-          <a:xfrm>
-            <a:off x="719999" y="2541600"/>
-            <a:ext cx="4918801" cy="3216273"/>
-          </a:xfrm>
-          <a:prstGeom prst="rect">
-            <a:avLst/>
-          </a:prstGeom>
-        </p:spPr>
-        <p:txBody>
-          <a:bodyPr vert="horz" lIns="0" tIns="0" rIns="0" bIns="0" rtlCol="0" anchorCtr="0">
-            <a:normAutofit/>
-          </a:bodyPr>
-          <a:lstStyle>
-            <a:lvl1pPr algn="l" defTabSz="914400" rtl="0" eaLnBrk="1" latinLnBrk="0" hangingPunct="1">
-              <a:lnSpc>
-                <a:spcPct val="100000"/>
-              </a:lnSpc>
-              <a:spcBef>
-                <a:spcPct val="0"/>
-              </a:spcBef>
-              <a:buNone/>
-              <a:defRPr sz="3200" kern="1200" cap="none" baseline="0">
-                <a:solidFill>
-                  <a:schemeClr val="tx1"/>
-                </a:solidFill>
-                <a:latin typeface="+mj-lt"/>
-                <a:ea typeface="+mj-ea"/>
-                <a:cs typeface="+mj-cs"/>
-              </a:defRPr>
-            </a:lvl1pPr>
-          </a:lstStyle>
-          <a:p>
-            <a:pPr indent="-228600">
-              <a:lnSpc>
-                <a:spcPct val="120000"/>
-              </a:lnSpc>
-              <a:spcAft>
-                <a:spcPts val="600"/>
-              </a:spcAft>
-              <a:buClr>
-                <a:schemeClr val="accent4"/>
-              </a:buClr>
-              <a:buFont typeface="The Hand Extrablack" panose="03070A02030502020204" pitchFamily="66" charset="0"/>
-              <a:buChar char="•"/>
-            </a:pPr>
-            <a:r>
-              <a:rPr lang="en-US" sz="2000" spc="20" dirty="0">
-                <a:solidFill>
-                  <a:schemeClr val="tx1">
-                    <a:alpha val="58000"/>
-                  </a:schemeClr>
-                </a:solidFill>
-                <a:latin typeface="+mn-lt"/>
-                <a:ea typeface="+mn-ea"/>
-                <a:cs typeface="+mn-cs"/>
-              </a:rPr>
-              <a:t>DESCRIPTION OF DATA EXPLORATION PHASE</a:t>
-            </a:r>
-          </a:p>
-        </p:txBody>
-      </p:sp>
-      <p:pic>
-        <p:nvPicPr>
-          <p:cNvPr id="7" name="Graphic 6" descr="Bar chart">
-            <a:extLst>
-              <a:ext uri="{FF2B5EF4-FFF2-40B4-BE49-F238E27FC236}">
-                <a16:creationId xmlns:a16="http://schemas.microsoft.com/office/drawing/2014/main" id="{91F47F48-2FC0-A3D1-BE6A-D5B2FC157F74}"/>
-              </a:ext>
-            </a:extLst>
-          </p:cNvPr>
-          <p:cNvPicPr>
-            <a:picLocks noChangeAspect="1"/>
-          </p:cNvPicPr>
-          <p:nvPr/>
-        </p:nvPicPr>
-        <p:blipFill>
-          <a:blip r:embed="rId2">
-            <a:extLst>
-              <a:ext uri="{28A0092B-C50C-407E-A947-70E740481C1C}">
-                <a14:useLocalDpi xmlns:a14="http://schemas.microsoft.com/office/drawing/2010/main" val="0"/>
-              </a:ext>
-              <a:ext uri="{96DAC541-7B7A-43D3-8B79-37D633B846F1}">
-                <asvg:svgBlip xmlns:asvg="http://schemas.microsoft.com/office/drawing/2016/SVG/main" r:embed="rId3"/>
-              </a:ext>
-            </a:extLst>
-          </a:blip>
-          <a:stretch>
-            <a:fillRect/>
-          </a:stretch>
-        </p:blipFill>
-        <p:spPr>
-          <a:xfrm>
-            <a:off x="6257496" y="981076"/>
-            <a:ext cx="5214506" cy="5214506"/>
-          </a:xfrm>
-          <a:custGeom>
-            <a:avLst/>
-            <a:gdLst/>
-            <a:ahLst/>
-            <a:cxnLst/>
-            <a:rect l="l" t="t" r="r" b="b"/>
-            <a:pathLst>
-              <a:path w="3095625" h="5409338">
-                <a:moveTo>
-                  <a:pt x="0" y="0"/>
-                </a:moveTo>
-                <a:lnTo>
-                  <a:pt x="3095625" y="0"/>
-                </a:lnTo>
-                <a:lnTo>
-                  <a:pt x="3095625" y="5409338"/>
-                </a:lnTo>
-                <a:lnTo>
-                  <a:pt x="0" y="5409338"/>
-                </a:lnTo>
-                <a:close/>
-              </a:path>
-            </a:pathLst>
-          </a:custGeom>
-        </p:spPr>
-      </p:pic>
-    </p:spTree>
-    <p:extLst>
-      <p:ext uri="{BB962C8B-B14F-4D97-AF65-F5344CB8AC3E}">
-        <p14:creationId xmlns:p14="http://schemas.microsoft.com/office/powerpoint/2010/main" val="3474649335"/>
-      </p:ext>
-    </p:extLst>
-  </p:cSld>
-  <p:clrMapOvr>
-    <a:masterClrMapping/>
-  </p:clrMapOvr>
-</p:sld>
-</file>
-
-<file path=ppt/slides/slide9.xml><?xml version="1.0" encoding="utf-8"?>
-<p:sld xmlns:a="http://schemas.openxmlformats.org/drawingml/2006/main" xmlns:r="http://schemas.openxmlformats.org/officeDocument/2006/relationships" xmlns:p="http://schemas.openxmlformats.org/presentationml/2006/main">
-  <p:cSld>
-    <p:bg>
-      <p:bgPr>
-        <a:solidFill>
-          <a:schemeClr val="bg2"/>
-        </a:solidFill>
-        <a:effectLst/>
-      </p:bgPr>
-    </p:bg>
-    <p:spTree>
-      <p:nvGrpSpPr>
-        <p:cNvPr id="1" name=""/>
-        <p:cNvGrpSpPr/>
-        <p:nvPr/>
-      </p:nvGrpSpPr>
-      <p:grpSpPr>
-        <a:xfrm>
-          <a:off x="0" y="0"/>
-          <a:ext cx="0" cy="0"/>
-          <a:chOff x="0" y="0"/>
-          <a:chExt cx="0" cy="0"/>
-        </a:xfrm>
-      </p:grpSpPr>
-      <p:sp useBgFill="1">
-        <p:nvSpPr>
-          <p:cNvPr id="12" name="Rectangle 11">
-            <a:extLst>
-              <a:ext uri="{FF2B5EF4-FFF2-40B4-BE49-F238E27FC236}">
                 <a16:creationId xmlns:a16="http://schemas.microsoft.com/office/drawing/2014/main" id="{468DC7FA-55C9-47D5-B8A0-022B4C9AACA7}"/>
               </a:ext>
               <a:ext uri="{C183D7F6-B498-43B3-948B-1728B52AA6E4}">
@@ -8105,7 +7639,7 @@
         <p:spPr>
           <a:xfrm>
             <a:off x="6096000" y="2305050"/>
-            <a:ext cx="5375962" cy="3452823"/>
+            <a:ext cx="5375962" cy="3535913"/>
           </a:xfrm>
           <a:prstGeom prst="rect">
             <a:avLst/>
@@ -8113,7 +7647,7 @@
         </p:spPr>
         <p:txBody>
           <a:bodyPr vert="horz" lIns="0" tIns="0" rIns="0" bIns="0" rtlCol="0" anchorCtr="0">
-            <a:normAutofit/>
+            <a:normAutofit fontScale="47500" lnSpcReduction="20000"/>
           </a:bodyPr>
           <a:lstStyle>
             <a:lvl1pPr algn="l" defTabSz="914400" rtl="0" eaLnBrk="1" latinLnBrk="0" hangingPunct="1">
@@ -8149,7 +7683,7 @@
               <a:buChar char="•"/>
             </a:pPr>
             <a:r>
-              <a:rPr lang="en-US" sz="2000" spc="20" dirty="0">
+              <a:rPr lang="en-US" sz="3800" spc="20" dirty="0">
                 <a:solidFill>
                   <a:schemeClr val="tx1">
                     <a:alpha val="58000"/>
@@ -8159,8 +7693,164 @@
                 <a:ea typeface="+mn-ea"/>
                 <a:cs typeface="+mn-cs"/>
               </a:rPr>
-              <a:t>DESCRIPTION OF ANALYSIS PHASE</a:t>
-            </a:r>
+              <a:t>The team chose to predict a binary increase or decrease in food insecurity with time period spanning from 2017 to 2019.</a:t>
+            </a:r>
+          </a:p>
+          <a:p>
+            <a:pPr indent="-228600">
+              <a:lnSpc>
+                <a:spcPct val="120000"/>
+              </a:lnSpc>
+              <a:spcAft>
+                <a:spcPts val="600"/>
+              </a:spcAft>
+              <a:buClr>
+                <a:schemeClr val="accent4"/>
+              </a:buClr>
+              <a:buFont typeface="The Hand Extrablack" panose="03070A02030502020204" pitchFamily="66" charset="0"/>
+              <a:buChar char="•"/>
+            </a:pPr>
+            <a:endParaRPr lang="en-US" sz="3800" spc="20" dirty="0">
+              <a:solidFill>
+                <a:schemeClr val="tx1">
+                  <a:alpha val="58000"/>
+                </a:schemeClr>
+              </a:solidFill>
+              <a:latin typeface="+mn-lt"/>
+              <a:ea typeface="+mn-ea"/>
+              <a:cs typeface="+mn-cs"/>
+            </a:endParaRPr>
+          </a:p>
+          <a:p>
+            <a:pPr indent="-228600">
+              <a:lnSpc>
+                <a:spcPct val="120000"/>
+              </a:lnSpc>
+              <a:spcAft>
+                <a:spcPts val="600"/>
+              </a:spcAft>
+              <a:buClr>
+                <a:schemeClr val="accent4"/>
+              </a:buClr>
+              <a:buFont typeface="The Hand Extrablack" panose="03070A02030502020204" pitchFamily="66" charset="0"/>
+              <a:buChar char="•"/>
+            </a:pPr>
+            <a:r>
+              <a:rPr lang="en-US" sz="3800" spc="20" dirty="0">
+                <a:solidFill>
+                  <a:schemeClr val="tx1">
+                    <a:alpha val="58000"/>
+                  </a:schemeClr>
+                </a:solidFill>
+                <a:latin typeface="+mn-lt"/>
+                <a:ea typeface="+mn-ea"/>
+                <a:cs typeface="+mn-cs"/>
+              </a:rPr>
+              <a:t>Team 6 recognized a skewed /imbalanced nature of the y-variable.</a:t>
+            </a:r>
+          </a:p>
+          <a:p>
+            <a:pPr indent="-228600">
+              <a:lnSpc>
+                <a:spcPct val="120000"/>
+              </a:lnSpc>
+              <a:spcAft>
+                <a:spcPts val="600"/>
+              </a:spcAft>
+              <a:buClr>
+                <a:schemeClr val="accent4"/>
+              </a:buClr>
+              <a:buFont typeface="The Hand Extrablack" panose="03070A02030502020204" pitchFamily="66" charset="0"/>
+              <a:buChar char="•"/>
+            </a:pPr>
+            <a:endParaRPr lang="en-US" sz="3800" spc="20" dirty="0">
+              <a:solidFill>
+                <a:schemeClr val="tx1">
+                  <a:alpha val="58000"/>
+                </a:schemeClr>
+              </a:solidFill>
+              <a:latin typeface="+mn-lt"/>
+              <a:ea typeface="+mn-ea"/>
+              <a:cs typeface="+mn-cs"/>
+            </a:endParaRPr>
+          </a:p>
+          <a:p>
+            <a:pPr indent="-228600">
+              <a:lnSpc>
+                <a:spcPct val="120000"/>
+              </a:lnSpc>
+              <a:spcAft>
+                <a:spcPts val="600"/>
+              </a:spcAft>
+              <a:buClr>
+                <a:schemeClr val="accent4"/>
+              </a:buClr>
+              <a:buFont typeface="The Hand Extrablack" panose="03070A02030502020204" pitchFamily="66" charset="0"/>
+              <a:buChar char="•"/>
+            </a:pPr>
+            <a:r>
+              <a:rPr lang="en-US" sz="3800" spc="20" dirty="0">
+                <a:solidFill>
+                  <a:schemeClr val="tx1">
+                    <a:alpha val="58000"/>
+                  </a:schemeClr>
+                </a:solidFill>
+                <a:latin typeface="+mn-lt"/>
+                <a:ea typeface="+mn-ea"/>
+                <a:cs typeface="+mn-cs"/>
+              </a:rPr>
+              <a:t>The team utilized two methods to account for this imbalance being  Balanced Random Forest Classifier and Easy Ensemble AdaBoost Classifier.</a:t>
+            </a:r>
+          </a:p>
+          <a:p>
+            <a:pPr indent="-228600">
+              <a:lnSpc>
+                <a:spcPct val="120000"/>
+              </a:lnSpc>
+              <a:spcAft>
+                <a:spcPts val="600"/>
+              </a:spcAft>
+              <a:buClr>
+                <a:schemeClr val="accent4"/>
+              </a:buClr>
+              <a:buFont typeface="The Hand Extrablack" panose="03070A02030502020204" pitchFamily="66" charset="0"/>
+              <a:buChar char="•"/>
+            </a:pPr>
+            <a:endParaRPr lang="en-US" sz="2000" spc="20" dirty="0">
+              <a:solidFill>
+                <a:schemeClr val="tx1">
+                  <a:alpha val="58000"/>
+                </a:schemeClr>
+              </a:solidFill>
+              <a:latin typeface="+mn-lt"/>
+              <a:ea typeface="+mn-ea"/>
+              <a:cs typeface="+mn-cs"/>
+            </a:endParaRPr>
+          </a:p>
+          <a:p>
+            <a:pPr indent="-228600">
+              <a:lnSpc>
+                <a:spcPct val="120000"/>
+              </a:lnSpc>
+              <a:spcAft>
+                <a:spcPts val="600"/>
+              </a:spcAft>
+              <a:buClr>
+                <a:schemeClr val="accent4"/>
+              </a:buClr>
+              <a:buFont typeface="The Hand Extrablack" panose="03070A02030502020204" pitchFamily="66" charset="0"/>
+              <a:buChar char="•"/>
+            </a:pPr>
+            <a:endParaRPr lang="en-US" sz="2000" spc="20" dirty="0">
+              <a:solidFill>
+                <a:schemeClr val="tx1">
+                  <a:alpha val="58000"/>
+                </a:schemeClr>
+              </a:solidFill>
+              <a:latin typeface="+mn-lt"/>
+              <a:ea typeface="+mn-ea"/>
+              <a:cs typeface="+mn-cs"/>
+            </a:endParaRPr>
           </a:p>
         </p:txBody>
       </p:sp>
@@ -8168,6 +7858,563 @@
     <p:extLst>
       <p:ext uri="{BB962C8B-B14F-4D97-AF65-F5344CB8AC3E}">
         <p14:creationId xmlns:p14="http://schemas.microsoft.com/office/powerpoint/2010/main" val="2932720390"/>
+      </p:ext>
+    </p:extLst>
+  </p:cSld>
+  <p:clrMapOvr>
+    <a:masterClrMapping/>
+  </p:clrMapOvr>
+</p:sld>
+</file>
+
+<file path=ppt/slides/slide9.xml><?xml version="1.0" encoding="utf-8"?>
+<p:sld xmlns:a="http://schemas.openxmlformats.org/drawingml/2006/main" xmlns:r="http://schemas.openxmlformats.org/officeDocument/2006/relationships" xmlns:p="http://schemas.openxmlformats.org/presentationml/2006/main">
+  <p:cSld>
+    <p:bg>
+      <p:bgPr>
+        <a:solidFill>
+          <a:schemeClr val="bg2"/>
+        </a:solidFill>
+        <a:effectLst/>
+      </p:bgPr>
+    </p:bg>
+    <p:spTree>
+      <p:nvGrpSpPr>
+        <p:cNvPr id="1" name=""/>
+        <p:cNvGrpSpPr/>
+        <p:nvPr/>
+      </p:nvGrpSpPr>
+      <p:grpSpPr>
+        <a:xfrm>
+          <a:off x="0" y="0"/>
+          <a:ext cx="0" cy="0"/>
+          <a:chOff x="0" y="0"/>
+          <a:chExt cx="0" cy="0"/>
+        </a:xfrm>
+      </p:grpSpPr>
+      <p:sp>
+        <p:nvSpPr>
+          <p:cNvPr id="9" name="Rectangle 8">
+            <a:extLst>
+              <a:ext uri="{FF2B5EF4-FFF2-40B4-BE49-F238E27FC236}">
+                <a16:creationId xmlns:a16="http://schemas.microsoft.com/office/drawing/2014/main" id="{09646535-AEF6-4883-A4F9-EEC1F8B4319E}"/>
+              </a:ext>
+              <a:ext uri="{C183D7F6-B498-43B3-948B-1728B52AA6E4}">
+                <adec:decorative xmlns:adec="http://schemas.microsoft.com/office/drawing/2017/decorative" val="1"/>
+              </a:ext>
+            </a:extLst>
+          </p:cNvPr>
+          <p:cNvSpPr>
+            <a:spLocks noGrp="1" noRot="1" noChangeAspect="1" noMove="1" noResize="1" noEditPoints="1" noAdjustHandles="1" noChangeArrowheads="1" noChangeShapeType="1" noTextEdit="1"/>
+          </p:cNvSpPr>
+          <p:nvPr>
+            <p:extLst>
+              <p:ext uri="{386F3935-93C4-4BCD-93E2-E3B085C9AB24}">
+                <p16:designElem xmlns:p16="http://schemas.microsoft.com/office/powerpoint/2015/main" val="1"/>
+              </p:ext>
+            </p:extLst>
+          </p:nvPr>
+        </p:nvSpPr>
+        <p:spPr>
+          <a:xfrm>
+            <a:off x="0" y="0"/>
+            <a:ext cx="12192000" cy="6858000"/>
+          </a:xfrm>
+          <a:prstGeom prst="rect">
+            <a:avLst/>
+          </a:prstGeom>
+          <a:solidFill>
+            <a:schemeClr val="bg2">
+              <a:lumMod val="90000"/>
+              <a:lumOff val="10000"/>
+            </a:schemeClr>
+          </a:solidFill>
+          <a:ln w="12700" cap="flat" cmpd="sng" algn="ctr">
+            <a:noFill/>
+            <a:prstDash val="solid"/>
+            <a:miter lim="800000"/>
+          </a:ln>
+          <a:effectLst/>
+        </p:spPr>
+        <p:style>
+          <a:lnRef idx="2">
+            <a:schemeClr val="accent1">
+              <a:shade val="50000"/>
+            </a:schemeClr>
+          </a:lnRef>
+          <a:fillRef idx="1">
+            <a:schemeClr val="accent1"/>
+          </a:fillRef>
+          <a:effectRef idx="0">
+            <a:schemeClr val="accent1"/>
+          </a:effectRef>
+          <a:fontRef idx="minor">
+            <a:schemeClr val="lt1"/>
+          </a:fontRef>
+        </p:style>
+        <p:txBody>
+          <a:bodyPr rtlCol="0" anchor="ctr"/>
+          <a:lstStyle/>
+          <a:p>
+            <a:pPr algn="ctr"/>
+            <a:endParaRPr lang="en-US"/>
+          </a:p>
+        </p:txBody>
+      </p:sp>
+      <p:sp useBgFill="1">
+        <p:nvSpPr>
+          <p:cNvPr id="11" name="Rectangle 10">
+            <a:extLst>
+              <a:ext uri="{FF2B5EF4-FFF2-40B4-BE49-F238E27FC236}">
+                <a16:creationId xmlns:a16="http://schemas.microsoft.com/office/drawing/2014/main" id="{742DFF2D-EA41-4CBE-9659-C2917E4882E5}"/>
+              </a:ext>
+              <a:ext uri="{C183D7F6-B498-43B3-948B-1728B52AA6E4}">
+                <adec:decorative xmlns:adec="http://schemas.microsoft.com/office/drawing/2017/decorative" val="1"/>
+              </a:ext>
+            </a:extLst>
+          </p:cNvPr>
+          <p:cNvSpPr>
+            <a:spLocks noGrp="1" noRot="1" noChangeAspect="1" noMove="1" noResize="1" noEditPoints="1" noAdjustHandles="1" noChangeArrowheads="1" noChangeShapeType="1" noTextEdit="1"/>
+          </p:cNvSpPr>
+          <p:nvPr>
+            <p:extLst>
+              <p:ext uri="{386F3935-93C4-4BCD-93E2-E3B085C9AB24}">
+                <p16:designElem xmlns:p16="http://schemas.microsoft.com/office/powerpoint/2015/main" val="1"/>
+              </p:ext>
+            </p:extLst>
+          </p:nvPr>
+        </p:nvSpPr>
+        <p:spPr>
+          <a:xfrm>
+            <a:off x="0" y="0"/>
+            <a:ext cx="12192000" cy="6858000"/>
+          </a:xfrm>
+          <a:prstGeom prst="rect">
+            <a:avLst/>
+          </a:prstGeom>
+          <a:ln w="12700" cap="flat" cmpd="sng" algn="ctr">
+            <a:noFill/>
+            <a:prstDash val="solid"/>
+            <a:miter lim="800000"/>
+          </a:ln>
+          <a:effectLst/>
+        </p:spPr>
+        <p:style>
+          <a:lnRef idx="2">
+            <a:schemeClr val="accent1">
+              <a:shade val="50000"/>
+            </a:schemeClr>
+          </a:lnRef>
+          <a:fillRef idx="1">
+            <a:schemeClr val="accent1"/>
+          </a:fillRef>
+          <a:effectRef idx="0">
+            <a:schemeClr val="accent1"/>
+          </a:effectRef>
+          <a:fontRef idx="minor">
+            <a:schemeClr val="lt1"/>
+          </a:fontRef>
+        </p:style>
+        <p:txBody>
+          <a:bodyPr rtlCol="0" anchor="ctr"/>
+          <a:lstStyle/>
+          <a:p>
+            <a:pPr algn="ctr"/>
+            <a:endParaRPr lang="en-US"/>
+          </a:p>
+        </p:txBody>
+      </p:sp>
+      <p:sp>
+        <p:nvSpPr>
+          <p:cNvPr id="2" name="Title 1">
+            <a:extLst>
+              <a:ext uri="{FF2B5EF4-FFF2-40B4-BE49-F238E27FC236}">
+                <a16:creationId xmlns:a16="http://schemas.microsoft.com/office/drawing/2014/main" id="{6B4723EE-5137-C0E2-C5AA-0B6314509BAA}"/>
+              </a:ext>
+            </a:extLst>
+          </p:cNvPr>
+          <p:cNvSpPr>
+            <a:spLocks noGrp="1"/>
+          </p:cNvSpPr>
+          <p:nvPr>
+            <p:ph type="title"/>
+          </p:nvPr>
+        </p:nvSpPr>
+        <p:spPr>
+          <a:xfrm>
+            <a:off x="247650" y="419100"/>
+            <a:ext cx="6629400" cy="1971675"/>
+          </a:xfrm>
+        </p:spPr>
+        <p:txBody>
+          <a:bodyPr vert="horz" wrap="square" lIns="0" tIns="0" rIns="0" bIns="0" rtlCol="0" anchor="b" anchorCtr="0">
+            <a:normAutofit/>
+          </a:bodyPr>
+          <a:lstStyle/>
+          <a:p>
+            <a:pPr algn="ctr">
+              <a:lnSpc>
+                <a:spcPct val="90000"/>
+              </a:lnSpc>
+            </a:pPr>
+            <a:r>
+              <a:rPr lang="en-US" sz="3100" b="0" i="0" spc="-100" dirty="0">
+                <a:effectLst/>
+              </a:rPr>
+              <a:t>THE TECHNOLOGIES, LANGUAGES, TOOLS AND ALGORITHMS THAT THE TEAM USED THROUGHOUT THE PROJECT</a:t>
+            </a:r>
+            <a:endParaRPr lang="en-US" sz="3100" spc="-100" dirty="0"/>
+          </a:p>
+        </p:txBody>
+      </p:sp>
+      <p:pic>
+        <p:nvPicPr>
+          <p:cNvPr id="5" name="Picture 4" descr="Computer script on a screen">
+            <a:extLst>
+              <a:ext uri="{FF2B5EF4-FFF2-40B4-BE49-F238E27FC236}">
+                <a16:creationId xmlns:a16="http://schemas.microsoft.com/office/drawing/2014/main" id="{B010DBD8-036C-7705-F7CA-A06E63E1A8BE}"/>
+              </a:ext>
+            </a:extLst>
+          </p:cNvPr>
+          <p:cNvPicPr>
+            <a:picLocks noChangeAspect="1"/>
+          </p:cNvPicPr>
+          <p:nvPr/>
+        </p:nvPicPr>
+        <p:blipFill rotWithShape="1">
+          <a:blip r:embed="rId2"/>
+          <a:srcRect l="2554" r="42327" b="-1"/>
+          <a:stretch/>
+        </p:blipFill>
+        <p:spPr>
+          <a:xfrm>
+            <a:off x="6529067" y="10"/>
+            <a:ext cx="5662935" cy="6857990"/>
+          </a:xfrm>
+          <a:custGeom>
+            <a:avLst/>
+            <a:gdLst/>
+            <a:ahLst/>
+            <a:cxnLst/>
+            <a:rect l="l" t="t" r="r" b="b"/>
+            <a:pathLst>
+              <a:path w="5662935" h="6858000">
+                <a:moveTo>
+                  <a:pt x="598332" y="0"/>
+                </a:moveTo>
+                <a:lnTo>
+                  <a:pt x="5662935" y="0"/>
+                </a:lnTo>
+                <a:lnTo>
+                  <a:pt x="5662935" y="6858000"/>
+                </a:lnTo>
+                <a:lnTo>
+                  <a:pt x="0" y="6858000"/>
+                </a:lnTo>
+                <a:lnTo>
+                  <a:pt x="78957" y="6777438"/>
+                </a:lnTo>
+                <a:cubicBezTo>
+                  <a:pt x="291624" y="6544265"/>
+                  <a:pt x="490445" y="6275955"/>
+                  <a:pt x="672224" y="5969316"/>
+                </a:cubicBezTo>
+                <a:cubicBezTo>
+                  <a:pt x="914597" y="5515036"/>
+                  <a:pt x="1066080" y="5030470"/>
+                  <a:pt x="1217563" y="4515619"/>
+                </a:cubicBezTo>
+                <a:cubicBezTo>
+                  <a:pt x="1338748" y="3970483"/>
+                  <a:pt x="1399341" y="3516203"/>
+                  <a:pt x="1399341" y="3061922"/>
+                </a:cubicBezTo>
+                <a:cubicBezTo>
+                  <a:pt x="1399341" y="1948936"/>
+                  <a:pt x="1190580" y="1021447"/>
+                  <a:pt x="773055" y="279455"/>
+                </a:cubicBezTo>
+                <a:close/>
+              </a:path>
+            </a:pathLst>
+          </a:custGeom>
+        </p:spPr>
+      </p:pic>
+      <p:sp>
+        <p:nvSpPr>
+          <p:cNvPr id="6" name="TextBox 5">
+            <a:extLst>
+              <a:ext uri="{FF2B5EF4-FFF2-40B4-BE49-F238E27FC236}">
+                <a16:creationId xmlns:a16="http://schemas.microsoft.com/office/drawing/2014/main" id="{F31193C0-7D49-9C52-BE31-DEC81CDB49A7}"/>
+              </a:ext>
+            </a:extLst>
+          </p:cNvPr>
+          <p:cNvSpPr txBox="1"/>
+          <p:nvPr/>
+        </p:nvSpPr>
+        <p:spPr>
+          <a:xfrm>
+            <a:off x="371475" y="2610683"/>
+            <a:ext cx="6505575" cy="4247317"/>
+          </a:xfrm>
+          <a:prstGeom prst="rect">
+            <a:avLst/>
+          </a:prstGeom>
+          <a:noFill/>
+        </p:spPr>
+        <p:txBody>
+          <a:bodyPr wrap="square">
+            <a:spAutoFit/>
+          </a:bodyPr>
+          <a:lstStyle/>
+          <a:p>
+            <a:pPr marL="285750" indent="-285750">
+              <a:buFont typeface="Arial" panose="020B0604020202020204" pitchFamily="34" charset="0"/>
+              <a:buChar char="•"/>
+            </a:pPr>
+            <a:r>
+              <a:rPr lang="en-US" b="0" i="0" dirty="0">
+                <a:effectLst/>
+                <a:latin typeface="Roboto" panose="02000000000000000000" pitchFamily="2" charset="0"/>
+              </a:rPr>
+              <a:t>Slack</a:t>
+            </a:r>
+          </a:p>
+          <a:p>
+            <a:pPr marL="285750" indent="-285750">
+              <a:buFont typeface="Arial" panose="020B0604020202020204" pitchFamily="34" charset="0"/>
+              <a:buChar char="•"/>
+            </a:pPr>
+            <a:r>
+              <a:rPr lang="en-US" dirty="0" err="1">
+                <a:latin typeface="Roboto" panose="02000000000000000000" pitchFamily="2" charset="0"/>
+              </a:rPr>
+              <a:t>Github</a:t>
+            </a:r>
+            <a:endParaRPr lang="en-US" b="0" i="0" dirty="0">
+              <a:effectLst/>
+              <a:latin typeface="Roboto" panose="02000000000000000000" pitchFamily="2" charset="0"/>
+            </a:endParaRPr>
+          </a:p>
+          <a:p>
+            <a:pPr marL="285750" indent="-285750">
+              <a:buFont typeface="Arial" panose="020B0604020202020204" pitchFamily="34" charset="0"/>
+              <a:buChar char="•"/>
+            </a:pPr>
+            <a:r>
+              <a:rPr lang="en-US" b="0" i="0" dirty="0">
+                <a:effectLst/>
+                <a:latin typeface="Roboto" panose="02000000000000000000" pitchFamily="2" charset="0"/>
+              </a:rPr>
+              <a:t>EXCEL</a:t>
+            </a:r>
+          </a:p>
+          <a:p>
+            <a:pPr marL="285750" indent="-285750">
+              <a:buFont typeface="Arial" panose="020B0604020202020204" pitchFamily="34" charset="0"/>
+              <a:buChar char="•"/>
+            </a:pPr>
+            <a:r>
+              <a:rPr lang="en-US" b="0" i="0" dirty="0">
+                <a:effectLst/>
+                <a:latin typeface="Roboto" panose="02000000000000000000" pitchFamily="2" charset="0"/>
+              </a:rPr>
+              <a:t>PYTHON-</a:t>
+            </a:r>
+          </a:p>
+          <a:p>
+            <a:r>
+              <a:rPr lang="en-US" b="0" i="0" dirty="0">
+                <a:effectLst/>
+                <a:latin typeface="Roboto" panose="02000000000000000000" pitchFamily="2" charset="0"/>
+              </a:rPr>
+              <a:t>	 </a:t>
+            </a:r>
+            <a:r>
+              <a:rPr lang="en-US" b="0" i="0" dirty="0" err="1">
+                <a:effectLst/>
+                <a:latin typeface="Roboto" panose="02000000000000000000" pitchFamily="2" charset="0"/>
+              </a:rPr>
+              <a:t>Jupyter</a:t>
+            </a:r>
+            <a:r>
+              <a:rPr lang="en-US" b="0" i="0" dirty="0">
+                <a:effectLst/>
+                <a:latin typeface="Roboto" panose="02000000000000000000" pitchFamily="2" charset="0"/>
+              </a:rPr>
+              <a:t> Notebook</a:t>
+            </a:r>
+          </a:p>
+          <a:p>
+            <a:r>
+              <a:rPr lang="en-US" dirty="0">
+                <a:latin typeface="Roboto" panose="02000000000000000000" pitchFamily="2" charset="0"/>
+              </a:rPr>
+              <a:t>	</a:t>
+            </a:r>
+            <a:r>
+              <a:rPr lang="en-US" dirty="0" err="1">
+                <a:latin typeface="Roboto" panose="02000000000000000000" pitchFamily="2" charset="0"/>
+              </a:rPr>
+              <a:t>Sklearn</a:t>
+            </a:r>
+            <a:r>
+              <a:rPr lang="en-US" dirty="0">
+                <a:latin typeface="Roboto" panose="02000000000000000000" pitchFamily="2" charset="0"/>
+              </a:rPr>
+              <a:t> </a:t>
+            </a:r>
+          </a:p>
+          <a:p>
+            <a:r>
+              <a:rPr lang="en-US" b="0" i="0" dirty="0">
+                <a:effectLst/>
+                <a:latin typeface="Roboto" panose="02000000000000000000" pitchFamily="2" charset="0"/>
+              </a:rPr>
+              <a:t>	</a:t>
+            </a:r>
+            <a:r>
+              <a:rPr lang="en-US" dirty="0">
+                <a:latin typeface="Roboto" panose="02000000000000000000" pitchFamily="2" charset="0"/>
+              </a:rPr>
+              <a:t>Pandas Library</a:t>
+            </a:r>
+          </a:p>
+          <a:p>
+            <a:r>
+              <a:rPr lang="en-US" b="0" i="0" dirty="0">
+                <a:effectLst/>
+                <a:latin typeface="Roboto" panose="02000000000000000000" pitchFamily="2" charset="0"/>
+              </a:rPr>
+              <a:t>	</a:t>
+            </a:r>
+            <a:r>
+              <a:rPr lang="en-US" b="0" i="0" dirty="0" err="1">
+                <a:effectLst/>
+                <a:latin typeface="Roboto" panose="02000000000000000000" pitchFamily="2" charset="0"/>
+              </a:rPr>
+              <a:t>imblearn</a:t>
+            </a:r>
+            <a:endParaRPr lang="en-US" b="0" i="0" dirty="0">
+              <a:effectLst/>
+              <a:latin typeface="Roboto" panose="02000000000000000000" pitchFamily="2" charset="0"/>
+            </a:endParaRPr>
+          </a:p>
+          <a:p>
+            <a:pPr marL="285750" indent="-285750">
+              <a:buFont typeface="Arial" panose="020B0604020202020204" pitchFamily="34" charset="0"/>
+              <a:buChar char="•"/>
+            </a:pPr>
+            <a:r>
+              <a:rPr lang="en-US" dirty="0">
+                <a:latin typeface="Roboto" panose="02000000000000000000" pitchFamily="2" charset="0"/>
+              </a:rPr>
+              <a:t>ERD Generator- </a:t>
+            </a:r>
+            <a:r>
+              <a:rPr lang="en-US" dirty="0" err="1">
+                <a:hlinkClick r:id="rId3">
+                  <a:extLst>
+                    <a:ext uri="{A12FA001-AC4F-418D-AE19-62706E023703}">
+                      <ahyp:hlinkClr xmlns:ahyp="http://schemas.microsoft.com/office/drawing/2018/hyperlinkcolor" val="tx"/>
+                    </a:ext>
+                  </a:extLst>
+                </a:hlinkClick>
+              </a:rPr>
+              <a:t>QuickDBD</a:t>
+            </a:r>
+            <a:r>
+              <a:rPr lang="en-US" dirty="0">
+                <a:hlinkClick r:id="rId3">
+                  <a:extLst>
+                    <a:ext uri="{A12FA001-AC4F-418D-AE19-62706E023703}">
+                      <ahyp:hlinkClr xmlns:ahyp="http://schemas.microsoft.com/office/drawing/2018/hyperlinkcolor" val="tx"/>
+                    </a:ext>
+                  </a:extLst>
+                </a:hlinkClick>
+              </a:rPr>
+              <a:t> (quickdatabasediagrams.com)</a:t>
+            </a:r>
+            <a:endParaRPr lang="en-US" b="0" i="0" dirty="0">
+              <a:effectLst/>
+              <a:latin typeface="Roboto" panose="02000000000000000000" pitchFamily="2" charset="0"/>
+            </a:endParaRPr>
+          </a:p>
+          <a:p>
+            <a:pPr marL="285750" indent="-285750">
+              <a:buFont typeface="Arial" panose="020B0604020202020204" pitchFamily="34" charset="0"/>
+              <a:buChar char="•"/>
+            </a:pPr>
+            <a:r>
+              <a:rPr lang="en-US" dirty="0">
+                <a:latin typeface="Roboto" panose="02000000000000000000" pitchFamily="2" charset="0"/>
+              </a:rPr>
+              <a:t>PostgreSQL (</a:t>
+            </a:r>
+            <a:r>
+              <a:rPr lang="en-US" dirty="0" err="1">
+                <a:latin typeface="Roboto" panose="02000000000000000000" pitchFamily="2" charset="0"/>
+              </a:rPr>
+              <a:t>pgAdmin</a:t>
+            </a:r>
+            <a:r>
+              <a:rPr lang="en-US" dirty="0">
+                <a:latin typeface="Roboto" panose="02000000000000000000" pitchFamily="2" charset="0"/>
+              </a:rPr>
+              <a:t>)</a:t>
+            </a:r>
+          </a:p>
+          <a:p>
+            <a:pPr marL="285750" indent="-285750">
+              <a:buFont typeface="Arial" panose="020B0604020202020204" pitchFamily="34" charset="0"/>
+              <a:buChar char="•"/>
+            </a:pPr>
+            <a:r>
+              <a:rPr lang="en-US" dirty="0">
+                <a:latin typeface="Roboto" panose="02000000000000000000" pitchFamily="2" charset="0"/>
+              </a:rPr>
+              <a:t>Tableau </a:t>
+            </a:r>
+          </a:p>
+          <a:p>
+            <a:pPr marL="285750" indent="-285750">
+              <a:buFont typeface="Arial" panose="020B0604020202020204" pitchFamily="34" charset="0"/>
+              <a:buChar char="•"/>
+            </a:pPr>
+            <a:r>
+              <a:rPr lang="en-US" dirty="0">
+                <a:latin typeface="Roboto" panose="02000000000000000000" pitchFamily="2" charset="0"/>
+              </a:rPr>
+              <a:t>Zoom</a:t>
+            </a:r>
+          </a:p>
+          <a:p>
+            <a:pPr marL="285750" indent="-285750">
+              <a:buFont typeface="Arial" panose="020B0604020202020204" pitchFamily="34" charset="0"/>
+              <a:buChar char="•"/>
+            </a:pPr>
+            <a:endParaRPr lang="en-US" dirty="0">
+              <a:latin typeface="Roboto" panose="02000000000000000000" pitchFamily="2" charset="0"/>
+            </a:endParaRPr>
+          </a:p>
+          <a:p>
+            <a:pPr marL="285750" indent="-285750">
+              <a:buFont typeface="Arial" panose="020B0604020202020204" pitchFamily="34" charset="0"/>
+              <a:buChar char="•"/>
+            </a:pPr>
+            <a:endParaRPr lang="en-US" dirty="0">
+              <a:latin typeface="Roboto" panose="02000000000000000000" pitchFamily="2" charset="0"/>
+            </a:endParaRPr>
+          </a:p>
+          <a:p>
+            <a:endParaRPr lang="en-US" dirty="0"/>
+          </a:p>
+        </p:txBody>
+      </p:sp>
+    </p:spTree>
+    <p:extLst>
+      <p:ext uri="{BB962C8B-B14F-4D97-AF65-F5344CB8AC3E}">
+        <p14:creationId xmlns:p14="http://schemas.microsoft.com/office/powerpoint/2010/main" val="3945959391"/>
       </p:ext>
     </p:extLst>
   </p:cSld>

</xml_diff>